<commit_message>
Complete tests for sync text alignment.
</commit_message>
<xml_diff>
--- a/doc/test/SyncLab/SyncLab_Text.pptx
+++ b/doc/test/SyncLab/SyncLab_Text.pptx
@@ -8,14 +8,16 @@
     <p:sldMasterId id="2147483684" r:id="rId4"/>
   </p:sldMasterIdLst>
   <p:notesMasterIdLst>
-    <p:notesMasterId r:id="rId10"/>
+    <p:notesMasterId r:id="rId12"/>
   </p:notesMasterIdLst>
   <p:sldIdLst>
     <p:sldId id="287" r:id="rId5"/>
     <p:sldId id="256" r:id="rId6"/>
     <p:sldId id="311" r:id="rId7"/>
     <p:sldId id="294" r:id="rId8"/>
-    <p:sldId id="312" r:id="rId9"/>
+    <p:sldId id="313" r:id="rId9"/>
+    <p:sldId id="312" r:id="rId10"/>
+    <p:sldId id="314" r:id="rId11"/>
   </p:sldIdLst>
   <p:sldSz cx="9144000" cy="6858000" type="screen4x3"/>
   <p:notesSz cx="6858000" cy="9144000"/>
@@ -127,7 +129,9 @@
           <p14:sldIdLst>
             <p14:sldId id="311"/>
             <p14:sldId id="294"/>
+            <p14:sldId id="313"/>
             <p14:sldId id="312"/>
+            <p14:sldId id="314"/>
           </p14:sldIdLst>
         </p14:section>
       </p14:sectionLst>
@@ -221,7 +225,7 @@
           <a:p>
             <a:fld id="{43E32005-3A63-48D2-8C73-BF5F95786EBD}" type="datetimeFigureOut">
               <a:rPr lang="en-US" smtClean="0"/>
-              <a:t>2/7/2019</a:t>
+              <a:t>2/11/2019</a:t>
             </a:fld>
             <a:endParaRPr lang="en-US"/>
           </a:p>
@@ -652,7 +656,181 @@
     </p:spTree>
     <p:extLst>
       <p:ext uri="{BB962C8B-B14F-4D97-AF65-F5344CB8AC3E}">
+        <p14:creationId xmlns:p14="http://schemas.microsoft.com/office/powerpoint/2010/main" val="2107463775"/>
+      </p:ext>
+    </p:extLst>
+  </p:cSld>
+  <p:clrMapOvr>
+    <a:masterClrMapping/>
+  </p:clrMapOvr>
+</p:notes>
+</file>
+
+<file path=ppt/notesSlides/notesSlide3.xml><?xml version="1.0" encoding="utf-8"?>
+<p:notes xmlns:a="http://schemas.openxmlformats.org/drawingml/2006/main" xmlns:r="http://schemas.openxmlformats.org/officeDocument/2006/relationships" xmlns:p="http://schemas.openxmlformats.org/presentationml/2006/main">
+  <p:cSld>
+    <p:spTree>
+      <p:nvGrpSpPr>
+        <p:cNvPr id="1" name=""/>
+        <p:cNvGrpSpPr/>
+        <p:nvPr/>
+      </p:nvGrpSpPr>
+      <p:grpSpPr>
+        <a:xfrm>
+          <a:off x="0" y="0"/>
+          <a:ext cx="0" cy="0"/>
+          <a:chOff x="0" y="0"/>
+          <a:chExt cx="0" cy="0"/>
+        </a:xfrm>
+      </p:grpSpPr>
+      <p:sp>
+        <p:nvSpPr>
+          <p:cNvPr id="2" name="Slide Image Placeholder 1"/>
+          <p:cNvSpPr>
+            <a:spLocks noGrp="1" noRot="1" noChangeAspect="1"/>
+          </p:cNvSpPr>
+          <p:nvPr>
+            <p:ph type="sldImg"/>
+          </p:nvPr>
+        </p:nvSpPr>
+        <p:spPr/>
+      </p:sp>
+      <p:sp>
+        <p:nvSpPr>
+          <p:cNvPr id="3" name="Notes Placeholder 2"/>
+          <p:cNvSpPr>
+            <a:spLocks noGrp="1"/>
+          </p:cNvSpPr>
+          <p:nvPr>
+            <p:ph type="body" idx="1"/>
+          </p:nvPr>
+        </p:nvSpPr>
+        <p:spPr/>
+        <p:txBody>
+          <a:bodyPr/>
+          <a:lstStyle/>
+          <a:p>
+            <a:r>
+              <a:rPr lang="en-US" dirty="0"/>
+              <a:t>Original Shapes</a:t>
+            </a:r>
+          </a:p>
+        </p:txBody>
+      </p:sp>
+      <p:sp>
+        <p:nvSpPr>
+          <p:cNvPr id="4" name="Slide Number Placeholder 3"/>
+          <p:cNvSpPr>
+            <a:spLocks noGrp="1"/>
+          </p:cNvSpPr>
+          <p:nvPr>
+            <p:ph type="sldNum" sz="quarter" idx="10"/>
+          </p:nvPr>
+        </p:nvSpPr>
+        <p:spPr/>
+        <p:txBody>
+          <a:bodyPr/>
+          <a:lstStyle/>
+          <a:p>
+            <a:fld id="{0FE7C38A-472B-4221-8E00-509E1DA863EC}" type="slidenum">
+              <a:rPr lang="en-US" smtClean="0"/>
+              <a:t>6</a:t>
+            </a:fld>
+            <a:endParaRPr lang="en-US"/>
+          </a:p>
+        </p:txBody>
+      </p:sp>
+    </p:spTree>
+    <p:extLst>
+      <p:ext uri="{BB962C8B-B14F-4D97-AF65-F5344CB8AC3E}">
         <p14:creationId xmlns:p14="http://schemas.microsoft.com/office/powerpoint/2010/main" val="2715867886"/>
+      </p:ext>
+    </p:extLst>
+  </p:cSld>
+  <p:clrMapOvr>
+    <a:masterClrMapping/>
+  </p:clrMapOvr>
+</p:notes>
+</file>
+
+<file path=ppt/notesSlides/notesSlide4.xml><?xml version="1.0" encoding="utf-8"?>
+<p:notes xmlns:a="http://schemas.openxmlformats.org/drawingml/2006/main" xmlns:r="http://schemas.openxmlformats.org/officeDocument/2006/relationships" xmlns:p="http://schemas.openxmlformats.org/presentationml/2006/main">
+  <p:cSld>
+    <p:spTree>
+      <p:nvGrpSpPr>
+        <p:cNvPr id="1" name=""/>
+        <p:cNvGrpSpPr/>
+        <p:nvPr/>
+      </p:nvGrpSpPr>
+      <p:grpSpPr>
+        <a:xfrm>
+          <a:off x="0" y="0"/>
+          <a:ext cx="0" cy="0"/>
+          <a:chOff x="0" y="0"/>
+          <a:chExt cx="0" cy="0"/>
+        </a:xfrm>
+      </p:grpSpPr>
+      <p:sp>
+        <p:nvSpPr>
+          <p:cNvPr id="2" name="Slide Image Placeholder 1"/>
+          <p:cNvSpPr>
+            <a:spLocks noGrp="1" noRot="1" noChangeAspect="1"/>
+          </p:cNvSpPr>
+          <p:nvPr>
+            <p:ph type="sldImg"/>
+          </p:nvPr>
+        </p:nvSpPr>
+        <p:spPr/>
+      </p:sp>
+      <p:sp>
+        <p:nvSpPr>
+          <p:cNvPr id="3" name="Notes Placeholder 2"/>
+          <p:cNvSpPr>
+            <a:spLocks noGrp="1"/>
+          </p:cNvSpPr>
+          <p:nvPr>
+            <p:ph type="body" idx="1"/>
+          </p:nvPr>
+        </p:nvSpPr>
+        <p:spPr/>
+        <p:txBody>
+          <a:bodyPr/>
+          <a:lstStyle/>
+          <a:p>
+            <a:r>
+              <a:rPr lang="en-US" dirty="0"/>
+              <a:t>Original Shapes</a:t>
+            </a:r>
+          </a:p>
+        </p:txBody>
+      </p:sp>
+      <p:sp>
+        <p:nvSpPr>
+          <p:cNvPr id="4" name="Slide Number Placeholder 3"/>
+          <p:cNvSpPr>
+            <a:spLocks noGrp="1"/>
+          </p:cNvSpPr>
+          <p:nvPr>
+            <p:ph type="sldNum" sz="quarter" idx="10"/>
+          </p:nvPr>
+        </p:nvSpPr>
+        <p:spPr/>
+        <p:txBody>
+          <a:bodyPr/>
+          <a:lstStyle/>
+          <a:p>
+            <a:fld id="{0FE7C38A-472B-4221-8E00-509E1DA863EC}" type="slidenum">
+              <a:rPr lang="en-US" smtClean="0"/>
+              <a:t>7</a:t>
+            </a:fld>
+            <a:endParaRPr lang="en-US"/>
+          </a:p>
+        </p:txBody>
+      </p:sp>
+    </p:spTree>
+    <p:extLst>
+      <p:ext uri="{BB962C8B-B14F-4D97-AF65-F5344CB8AC3E}">
+        <p14:creationId xmlns:p14="http://schemas.microsoft.com/office/powerpoint/2010/main" val="3284066831"/>
       </p:ext>
     </p:extLst>
   </p:cSld>
@@ -841,7 +1019,7 @@
           <a:p>
             <a:fld id="{699DC775-C286-4358-8C92-D7E584E969B3}" type="datetimeFigureOut">
               <a:rPr lang="en-US" smtClean="0"/>
-              <a:t>2/7/2019</a:t>
+              <a:t>2/11/2019</a:t>
             </a:fld>
             <a:endParaRPr lang="en-US"/>
           </a:p>
@@ -1009,7 +1187,7 @@
           <a:p>
             <a:fld id="{699DC775-C286-4358-8C92-D7E584E969B3}" type="datetimeFigureOut">
               <a:rPr lang="en-US" smtClean="0"/>
-              <a:t>2/7/2019</a:t>
+              <a:t>2/11/2019</a:t>
             </a:fld>
             <a:endParaRPr lang="en-US"/>
           </a:p>
@@ -1187,7 +1365,7 @@
           <a:p>
             <a:fld id="{699DC775-C286-4358-8C92-D7E584E969B3}" type="datetimeFigureOut">
               <a:rPr lang="en-US" smtClean="0"/>
-              <a:t>2/7/2019</a:t>
+              <a:t>2/11/2019</a:t>
             </a:fld>
             <a:endParaRPr lang="en-US"/>
           </a:p>
@@ -1427,7 +1605,7 @@
           <a:p>
             <a:fld id="{699DC775-C286-4358-8C92-D7E584E969B3}" type="datetimeFigureOut">
               <a:rPr lang="en-US" smtClean="0"/>
-              <a:t>2/7/2019</a:t>
+              <a:t>2/11/2019</a:t>
             </a:fld>
             <a:endParaRPr lang="en-US"/>
           </a:p>
@@ -1595,7 +1773,7 @@
           <a:p>
             <a:fld id="{699DC775-C286-4358-8C92-D7E584E969B3}" type="datetimeFigureOut">
               <a:rPr lang="en-US" smtClean="0"/>
-              <a:t>2/7/2019</a:t>
+              <a:t>2/11/2019</a:t>
             </a:fld>
             <a:endParaRPr lang="en-US"/>
           </a:p>
@@ -1840,7 +2018,7 @@
           <a:p>
             <a:fld id="{699DC775-C286-4358-8C92-D7E584E969B3}" type="datetimeFigureOut">
               <a:rPr lang="en-US" smtClean="0"/>
-              <a:t>2/7/2019</a:t>
+              <a:t>2/11/2019</a:t>
             </a:fld>
             <a:endParaRPr lang="en-US"/>
           </a:p>
@@ -2125,7 +2303,7 @@
           <a:p>
             <a:fld id="{699DC775-C286-4358-8C92-D7E584E969B3}" type="datetimeFigureOut">
               <a:rPr lang="en-US" smtClean="0"/>
-              <a:t>2/7/2019</a:t>
+              <a:t>2/11/2019</a:t>
             </a:fld>
             <a:endParaRPr lang="en-US"/>
           </a:p>
@@ -2544,7 +2722,7 @@
           <a:p>
             <a:fld id="{699DC775-C286-4358-8C92-D7E584E969B3}" type="datetimeFigureOut">
               <a:rPr lang="en-US" smtClean="0"/>
-              <a:t>2/7/2019</a:t>
+              <a:t>2/11/2019</a:t>
             </a:fld>
             <a:endParaRPr lang="en-US"/>
           </a:p>
@@ -2661,7 +2839,7 @@
           <a:p>
             <a:fld id="{699DC775-C286-4358-8C92-D7E584E969B3}" type="datetimeFigureOut">
               <a:rPr lang="en-US" smtClean="0"/>
-              <a:t>2/7/2019</a:t>
+              <a:t>2/11/2019</a:t>
             </a:fld>
             <a:endParaRPr lang="en-US"/>
           </a:p>
@@ -2756,7 +2934,7 @@
           <a:p>
             <a:fld id="{699DC775-C286-4358-8C92-D7E584E969B3}" type="datetimeFigureOut">
               <a:rPr lang="en-US" smtClean="0"/>
-              <a:t>2/7/2019</a:t>
+              <a:t>2/11/2019</a:t>
             </a:fld>
             <a:endParaRPr lang="en-US"/>
           </a:p>
@@ -3031,7 +3209,7 @@
           <a:p>
             <a:fld id="{699DC775-C286-4358-8C92-D7E584E969B3}" type="datetimeFigureOut">
               <a:rPr lang="en-US" smtClean="0"/>
-              <a:t>2/7/2019</a:t>
+              <a:t>2/11/2019</a:t>
             </a:fld>
             <a:endParaRPr lang="en-US"/>
           </a:p>
@@ -3199,7 +3377,7 @@
           <a:p>
             <a:fld id="{699DC775-C286-4358-8C92-D7E584E969B3}" type="datetimeFigureOut">
               <a:rPr lang="en-US" smtClean="0"/>
-              <a:t>2/7/2019</a:t>
+              <a:t>2/11/2019</a:t>
             </a:fld>
             <a:endParaRPr lang="en-US"/>
           </a:p>
@@ -3451,7 +3629,7 @@
           <a:p>
             <a:fld id="{699DC775-C286-4358-8C92-D7E584E969B3}" type="datetimeFigureOut">
               <a:rPr lang="en-US" smtClean="0"/>
-              <a:t>2/7/2019</a:t>
+              <a:t>2/11/2019</a:t>
             </a:fld>
             <a:endParaRPr lang="en-US"/>
           </a:p>
@@ -3619,7 +3797,7 @@
           <a:p>
             <a:fld id="{699DC775-C286-4358-8C92-D7E584E969B3}" type="datetimeFigureOut">
               <a:rPr lang="en-US" smtClean="0"/>
-              <a:t>2/7/2019</a:t>
+              <a:t>2/11/2019</a:t>
             </a:fld>
             <a:endParaRPr lang="en-US"/>
           </a:p>
@@ -3797,7 +3975,7 @@
           <a:p>
             <a:fld id="{699DC775-C286-4358-8C92-D7E584E969B3}" type="datetimeFigureOut">
               <a:rPr lang="en-US" smtClean="0"/>
-              <a:t>2/7/2019</a:t>
+              <a:t>2/11/2019</a:t>
             </a:fld>
             <a:endParaRPr lang="en-US"/>
           </a:p>
@@ -4045,7 +4223,7 @@
           <a:p>
             <a:fld id="{699DC775-C286-4358-8C92-D7E584E969B3}" type="datetimeFigureOut">
               <a:rPr lang="en-US" smtClean="0"/>
-              <a:t>2/7/2019</a:t>
+              <a:t>2/11/2019</a:t>
             </a:fld>
             <a:endParaRPr lang="en-US"/>
           </a:p>
@@ -4221,7 +4399,7 @@
           <a:p>
             <a:fld id="{699DC775-C286-4358-8C92-D7E584E969B3}" type="datetimeFigureOut">
               <a:rPr lang="en-US" smtClean="0"/>
-              <a:t>2/7/2019</a:t>
+              <a:t>2/11/2019</a:t>
             </a:fld>
             <a:endParaRPr lang="en-US"/>
           </a:p>
@@ -4474,7 +4652,7 @@
           <a:p>
             <a:fld id="{699DC775-C286-4358-8C92-D7E584E969B3}" type="datetimeFigureOut">
               <a:rPr lang="en-US" smtClean="0"/>
-              <a:t>2/7/2019</a:t>
+              <a:t>2/11/2019</a:t>
             </a:fld>
             <a:endParaRPr lang="en-US"/>
           </a:p>
@@ -4767,7 +4945,7 @@
           <a:p>
             <a:fld id="{699DC775-C286-4358-8C92-D7E584E969B3}" type="datetimeFigureOut">
               <a:rPr lang="en-US" smtClean="0"/>
-              <a:t>2/7/2019</a:t>
+              <a:t>2/11/2019</a:t>
             </a:fld>
             <a:endParaRPr lang="en-US"/>
           </a:p>
@@ -5194,7 +5372,7 @@
           <a:p>
             <a:fld id="{699DC775-C286-4358-8C92-D7E584E969B3}" type="datetimeFigureOut">
               <a:rPr lang="en-US" smtClean="0"/>
-              <a:t>2/7/2019</a:t>
+              <a:t>2/11/2019</a:t>
             </a:fld>
             <a:endParaRPr lang="en-US"/>
           </a:p>
@@ -5319,7 +5497,7 @@
           <a:p>
             <a:fld id="{699DC775-C286-4358-8C92-D7E584E969B3}" type="datetimeFigureOut">
               <a:rPr lang="en-US" smtClean="0"/>
-              <a:t>2/7/2019</a:t>
+              <a:t>2/11/2019</a:t>
             </a:fld>
             <a:endParaRPr lang="en-US"/>
           </a:p>
@@ -5422,7 +5600,7 @@
           <a:p>
             <a:fld id="{699DC775-C286-4358-8C92-D7E584E969B3}" type="datetimeFigureOut">
               <a:rPr lang="en-US" smtClean="0"/>
-              <a:t>2/7/2019</a:t>
+              <a:t>2/11/2019</a:t>
             </a:fld>
             <a:endParaRPr lang="en-US"/>
           </a:p>
@@ -5667,7 +5845,7 @@
           <a:p>
             <a:fld id="{699DC775-C286-4358-8C92-D7E584E969B3}" type="datetimeFigureOut">
               <a:rPr lang="en-US" smtClean="0"/>
-              <a:t>2/7/2019</a:t>
+              <a:t>2/11/2019</a:t>
             </a:fld>
             <a:endParaRPr lang="en-US"/>
           </a:p>
@@ -5950,7 +6128,7 @@
           <a:p>
             <a:fld id="{699DC775-C286-4358-8C92-D7E584E969B3}" type="datetimeFigureOut">
               <a:rPr lang="en-US" smtClean="0"/>
-              <a:t>2/7/2019</a:t>
+              <a:t>2/11/2019</a:t>
             </a:fld>
             <a:endParaRPr lang="en-US"/>
           </a:p>
@@ -6210,7 +6388,7 @@
           <a:p>
             <a:fld id="{699DC775-C286-4358-8C92-D7E584E969B3}" type="datetimeFigureOut">
               <a:rPr lang="en-US" smtClean="0"/>
-              <a:t>2/7/2019</a:t>
+              <a:t>2/11/2019</a:t>
             </a:fld>
             <a:endParaRPr lang="en-US"/>
           </a:p>
@@ -6386,7 +6564,7 @@
           <a:p>
             <a:fld id="{699DC775-C286-4358-8C92-D7E584E969B3}" type="datetimeFigureOut">
               <a:rPr lang="en-US" smtClean="0"/>
-              <a:t>2/7/2019</a:t>
+              <a:t>2/11/2019</a:t>
             </a:fld>
             <a:endParaRPr lang="en-US"/>
           </a:p>
@@ -6572,7 +6750,7 @@
           <a:p>
             <a:fld id="{699DC775-C286-4358-8C92-D7E584E969B3}" type="datetimeFigureOut">
               <a:rPr lang="en-US" smtClean="0"/>
-              <a:t>2/7/2019</a:t>
+              <a:t>2/11/2019</a:t>
             </a:fld>
             <a:endParaRPr lang="en-US"/>
           </a:p>
@@ -6762,7 +6940,7 @@
           <a:p>
             <a:fld id="{45696B32-6A70-48EC-8939-9D142D9557CD}" type="datetimeFigureOut">
               <a:rPr lang="en-US" smtClean="0"/>
-              <a:t>2/7/2019</a:t>
+              <a:t>2/11/2019</a:t>
             </a:fld>
             <a:endParaRPr lang="en-US"/>
           </a:p>
@@ -7076,7 +7254,7 @@
           <a:p>
             <a:fld id="{45696B32-6A70-48EC-8939-9D142D9557CD}" type="datetimeFigureOut">
               <a:rPr lang="en-US" smtClean="0"/>
-              <a:t>2/7/2019</a:t>
+              <a:t>2/11/2019</a:t>
             </a:fld>
             <a:endParaRPr lang="en-US"/>
           </a:p>
@@ -7321,7 +7499,7 @@
           <a:p>
             <a:fld id="{45696B32-6A70-48EC-8939-9D142D9557CD}" type="datetimeFigureOut">
               <a:rPr lang="en-US" smtClean="0"/>
-              <a:t>2/7/2019</a:t>
+              <a:t>2/11/2019</a:t>
             </a:fld>
             <a:endParaRPr lang="en-US"/>
           </a:p>
@@ -7550,7 +7728,7 @@
           <a:p>
             <a:fld id="{45696B32-6A70-48EC-8939-9D142D9557CD}" type="datetimeFigureOut">
               <a:rPr lang="en-US" smtClean="0"/>
-              <a:t>2/7/2019</a:t>
+              <a:t>2/11/2019</a:t>
             </a:fld>
             <a:endParaRPr lang="en-US"/>
           </a:p>
@@ -7914,7 +8092,7 @@
           <a:p>
             <a:fld id="{45696B32-6A70-48EC-8939-9D142D9557CD}" type="datetimeFigureOut">
               <a:rPr lang="en-US" smtClean="0"/>
-              <a:t>2/7/2019</a:t>
+              <a:t>2/11/2019</a:t>
             </a:fld>
             <a:endParaRPr lang="en-US"/>
           </a:p>
@@ -8031,7 +8209,7 @@
           <a:p>
             <a:fld id="{45696B32-6A70-48EC-8939-9D142D9557CD}" type="datetimeFigureOut">
               <a:rPr lang="en-US" smtClean="0"/>
-              <a:t>2/7/2019</a:t>
+              <a:t>2/11/2019</a:t>
             </a:fld>
             <a:endParaRPr lang="en-US"/>
           </a:p>
@@ -8316,7 +8494,7 @@
           <a:p>
             <a:fld id="{699DC775-C286-4358-8C92-D7E584E969B3}" type="datetimeFigureOut">
               <a:rPr lang="en-US" smtClean="0"/>
-              <a:t>2/7/2019</a:t>
+              <a:t>2/11/2019</a:t>
             </a:fld>
             <a:endParaRPr lang="en-US"/>
           </a:p>
@@ -8411,7 +8589,7 @@
           <a:p>
             <a:fld id="{45696B32-6A70-48EC-8939-9D142D9557CD}" type="datetimeFigureOut">
               <a:rPr lang="en-US" smtClean="0"/>
-              <a:t>2/7/2019</a:t>
+              <a:t>2/11/2019</a:t>
             </a:fld>
             <a:endParaRPr lang="en-US"/>
           </a:p>
@@ -8686,7 +8864,7 @@
           <a:p>
             <a:fld id="{45696B32-6A70-48EC-8939-9D142D9557CD}" type="datetimeFigureOut">
               <a:rPr lang="en-US" smtClean="0"/>
-              <a:t>2/7/2019</a:t>
+              <a:t>2/11/2019</a:t>
             </a:fld>
             <a:endParaRPr lang="en-US"/>
           </a:p>
@@ -8938,7 +9116,7 @@
           <a:p>
             <a:fld id="{45696B32-6A70-48EC-8939-9D142D9557CD}" type="datetimeFigureOut">
               <a:rPr lang="en-US" smtClean="0"/>
-              <a:t>2/7/2019</a:t>
+              <a:t>2/11/2019</a:t>
             </a:fld>
             <a:endParaRPr lang="en-US"/>
           </a:p>
@@ -9106,7 +9284,7 @@
           <a:p>
             <a:fld id="{45696B32-6A70-48EC-8939-9D142D9557CD}" type="datetimeFigureOut">
               <a:rPr lang="en-US" smtClean="0"/>
-              <a:t>2/7/2019</a:t>
+              <a:t>2/11/2019</a:t>
             </a:fld>
             <a:endParaRPr lang="en-US"/>
           </a:p>
@@ -9284,7 +9462,7 @@
           <a:p>
             <a:fld id="{45696B32-6A70-48EC-8939-9D142D9557CD}" type="datetimeFigureOut">
               <a:rPr lang="en-US" smtClean="0"/>
-              <a:t>2/7/2019</a:t>
+              <a:t>2/11/2019</a:t>
             </a:fld>
             <a:endParaRPr lang="en-US"/>
           </a:p>
@@ -9703,7 +9881,7 @@
           <a:p>
             <a:fld id="{699DC775-C286-4358-8C92-D7E584E969B3}" type="datetimeFigureOut">
               <a:rPr lang="en-US" smtClean="0"/>
-              <a:t>2/7/2019</a:t>
+              <a:t>2/11/2019</a:t>
             </a:fld>
             <a:endParaRPr lang="en-US"/>
           </a:p>
@@ -9820,7 +9998,7 @@
           <a:p>
             <a:fld id="{699DC775-C286-4358-8C92-D7E584E969B3}" type="datetimeFigureOut">
               <a:rPr lang="en-US" smtClean="0"/>
-              <a:t>2/7/2019</a:t>
+              <a:t>2/11/2019</a:t>
             </a:fld>
             <a:endParaRPr lang="en-US"/>
           </a:p>
@@ -9915,7 +10093,7 @@
           <a:p>
             <a:fld id="{699DC775-C286-4358-8C92-D7E584E969B3}" type="datetimeFigureOut">
               <a:rPr lang="en-US" smtClean="0"/>
-              <a:t>2/7/2019</a:t>
+              <a:t>2/11/2019</a:t>
             </a:fld>
             <a:endParaRPr lang="en-US"/>
           </a:p>
@@ -10190,7 +10368,7 @@
           <a:p>
             <a:fld id="{699DC775-C286-4358-8C92-D7E584E969B3}" type="datetimeFigureOut">
               <a:rPr lang="en-US" smtClean="0"/>
-              <a:t>2/7/2019</a:t>
+              <a:t>2/11/2019</a:t>
             </a:fld>
             <a:endParaRPr lang="en-US"/>
           </a:p>
@@ -10442,7 +10620,7 @@
           <a:p>
             <a:fld id="{699DC775-C286-4358-8C92-D7E584E969B3}" type="datetimeFigureOut">
               <a:rPr lang="en-US" smtClean="0"/>
-              <a:t>2/7/2019</a:t>
+              <a:t>2/11/2019</a:t>
             </a:fld>
             <a:endParaRPr lang="en-US"/>
           </a:p>
@@ -10653,7 +10831,7 @@
           <a:p>
             <a:fld id="{699DC775-C286-4358-8C92-D7E584E969B3}" type="datetimeFigureOut">
               <a:rPr lang="en-US" smtClean="0"/>
-              <a:t>2/7/2019</a:t>
+              <a:t>2/11/2019</a:t>
             </a:fld>
             <a:endParaRPr lang="en-US"/>
           </a:p>
@@ -11166,7 +11344,7 @@
           <a:p>
             <a:fld id="{699DC775-C286-4358-8C92-D7E584E969B3}" type="datetimeFigureOut">
               <a:rPr lang="en-US" smtClean="0"/>
-              <a:t>2/7/2019</a:t>
+              <a:t>2/11/2019</a:t>
             </a:fld>
             <a:endParaRPr lang="en-US"/>
           </a:p>
@@ -11677,7 +11855,7 @@
           <a:p>
             <a:fld id="{699DC775-C286-4358-8C92-D7E584E969B3}" type="datetimeFigureOut">
               <a:rPr lang="en-US" smtClean="0"/>
-              <a:t>2/7/2019</a:t>
+              <a:t>2/11/2019</a:t>
             </a:fld>
             <a:endParaRPr lang="en-US"/>
           </a:p>
@@ -12185,7 +12363,7 @@
           <a:p>
             <a:fld id="{45696B32-6A70-48EC-8939-9D142D9557CD}" type="datetimeFigureOut">
               <a:rPr lang="en-US" smtClean="0"/>
-              <a:t>2/7/2019</a:t>
+              <a:t>2/11/2019</a:t>
             </a:fld>
             <a:endParaRPr lang="en-US"/>
           </a:p>
@@ -12907,7 +13085,7 @@
       </p:grpSpPr>
       <p:sp>
         <p:nvSpPr>
-          <p:cNvPr id="3" name="TextBox 2">
+          <p:cNvPr id="3" name="Left source">
             <a:extLst>
               <a:ext uri="{FF2B5EF4-FFF2-40B4-BE49-F238E27FC236}">
                 <a16:creationId xmlns:a16="http://schemas.microsoft.com/office/drawing/2014/main" id="{1A17F2E3-B345-4AC9-A9F7-D0DF2AB2656A}"/>
@@ -12942,7 +13120,7 @@
       </p:sp>
       <p:sp>
         <p:nvSpPr>
-          <p:cNvPr id="8" name="TextBox 7">
+          <p:cNvPr id="8" name="Center source">
             <a:extLst>
               <a:ext uri="{FF2B5EF4-FFF2-40B4-BE49-F238E27FC236}">
                 <a16:creationId xmlns:a16="http://schemas.microsoft.com/office/drawing/2014/main" id="{2C5F2501-94CB-40B8-B613-490A084A6E56}"/>
@@ -12978,7 +13156,7 @@
       </p:sp>
       <p:sp>
         <p:nvSpPr>
-          <p:cNvPr id="9" name="TextBox 8">
+          <p:cNvPr id="9" name="Right source">
             <a:extLst>
               <a:ext uri="{FF2B5EF4-FFF2-40B4-BE49-F238E27FC236}">
                 <a16:creationId xmlns:a16="http://schemas.microsoft.com/office/drawing/2014/main" id="{7A5854C3-8AB2-41F5-AA1B-FB533D0EE730}"/>
@@ -13014,7 +13192,7 @@
       </p:sp>
       <p:sp>
         <p:nvSpPr>
-          <p:cNvPr id="10" name="TextBox 9">
+          <p:cNvPr id="10" name="Justify source">
             <a:extLst>
               <a:ext uri="{FF2B5EF4-FFF2-40B4-BE49-F238E27FC236}">
                 <a16:creationId xmlns:a16="http://schemas.microsoft.com/office/drawing/2014/main" id="{C258C011-B9B9-430F-842E-E6EDDCCAF93B}"/>
@@ -13050,7 +13228,7 @@
       </p:sp>
       <p:sp>
         <p:nvSpPr>
-          <p:cNvPr id="11" name="TextBox 10">
+          <p:cNvPr id="11" name="Left target">
             <a:extLst>
               <a:ext uri="{FF2B5EF4-FFF2-40B4-BE49-F238E27FC236}">
                 <a16:creationId xmlns:a16="http://schemas.microsoft.com/office/drawing/2014/main" id="{D8949655-9B3E-4FCA-947F-2A70F9AE41AA}"/>
@@ -13086,7 +13264,7 @@
       </p:sp>
       <p:sp>
         <p:nvSpPr>
-          <p:cNvPr id="12" name="TextBox 11">
+          <p:cNvPr id="12" name="Center target">
             <a:extLst>
               <a:ext uri="{FF2B5EF4-FFF2-40B4-BE49-F238E27FC236}">
                 <a16:creationId xmlns:a16="http://schemas.microsoft.com/office/drawing/2014/main" id="{BB7371B5-9FD6-4124-84D9-AD9E6AEC7EB6}"/>
@@ -13121,7 +13299,7 @@
       </p:sp>
       <p:sp>
         <p:nvSpPr>
-          <p:cNvPr id="13" name="TextBox 12">
+          <p:cNvPr id="13" name="Right target">
             <a:extLst>
               <a:ext uri="{FF2B5EF4-FFF2-40B4-BE49-F238E27FC236}">
                 <a16:creationId xmlns:a16="http://schemas.microsoft.com/office/drawing/2014/main" id="{0A371897-5C3C-453A-81E9-DF58C0EE8364}"/>
@@ -13157,7 +13335,7 @@
       </p:sp>
       <p:sp>
         <p:nvSpPr>
-          <p:cNvPr id="14" name="TextBox 13">
+          <p:cNvPr id="14" name="Justify target">
             <a:extLst>
               <a:ext uri="{FF2B5EF4-FFF2-40B4-BE49-F238E27FC236}">
                 <a16:creationId xmlns:a16="http://schemas.microsoft.com/office/drawing/2014/main" id="{5AC33D6C-4CC2-470D-8F70-0ECF7236B11E}"/>
@@ -13223,7 +13401,323 @@
       </p:grpSpPr>
       <p:sp>
         <p:nvSpPr>
-          <p:cNvPr id="15" name="Content Placeholder 2">
+          <p:cNvPr id="3" name="Left source">
+            <a:extLst>
+              <a:ext uri="{FF2B5EF4-FFF2-40B4-BE49-F238E27FC236}">
+                <a16:creationId xmlns:a16="http://schemas.microsoft.com/office/drawing/2014/main" id="{1A17F2E3-B345-4AC9-A9F7-D0DF2AB2656A}"/>
+              </a:ext>
+            </a:extLst>
+          </p:cNvPr>
+          <p:cNvSpPr txBox="1"/>
+          <p:nvPr/>
+        </p:nvSpPr>
+        <p:spPr>
+          <a:xfrm>
+            <a:off x="1066800" y="990600"/>
+            <a:ext cx="1828800" cy="369332"/>
+          </a:xfrm>
+          <a:prstGeom prst="rect">
+            <a:avLst/>
+          </a:prstGeom>
+          <a:noFill/>
+        </p:spPr>
+        <p:txBody>
+          <a:bodyPr wrap="square" rtlCol="0">
+            <a:spAutoFit/>
+          </a:bodyPr>
+          <a:lstStyle/>
+          <a:p>
+            <a:r>
+              <a:rPr lang="en-US" dirty="0"/>
+              <a:t>Left</a:t>
+            </a:r>
+          </a:p>
+        </p:txBody>
+      </p:sp>
+      <p:sp>
+        <p:nvSpPr>
+          <p:cNvPr id="8" name="Center source">
+            <a:extLst>
+              <a:ext uri="{FF2B5EF4-FFF2-40B4-BE49-F238E27FC236}">
+                <a16:creationId xmlns:a16="http://schemas.microsoft.com/office/drawing/2014/main" id="{2C5F2501-94CB-40B8-B613-490A084A6E56}"/>
+              </a:ext>
+            </a:extLst>
+          </p:cNvPr>
+          <p:cNvSpPr txBox="1"/>
+          <p:nvPr/>
+        </p:nvSpPr>
+        <p:spPr>
+          <a:xfrm>
+            <a:off x="1066800" y="2209800"/>
+            <a:ext cx="1828800" cy="369332"/>
+          </a:xfrm>
+          <a:prstGeom prst="rect">
+            <a:avLst/>
+          </a:prstGeom>
+          <a:noFill/>
+        </p:spPr>
+        <p:txBody>
+          <a:bodyPr wrap="square" rtlCol="0">
+            <a:spAutoFit/>
+          </a:bodyPr>
+          <a:lstStyle/>
+          <a:p>
+            <a:pPr algn="ctr"/>
+            <a:r>
+              <a:rPr lang="en-US" dirty="0"/>
+              <a:t>Center</a:t>
+            </a:r>
+          </a:p>
+        </p:txBody>
+      </p:sp>
+      <p:sp>
+        <p:nvSpPr>
+          <p:cNvPr id="9" name="Right source">
+            <a:extLst>
+              <a:ext uri="{FF2B5EF4-FFF2-40B4-BE49-F238E27FC236}">
+                <a16:creationId xmlns:a16="http://schemas.microsoft.com/office/drawing/2014/main" id="{7A5854C3-8AB2-41F5-AA1B-FB533D0EE730}"/>
+              </a:ext>
+            </a:extLst>
+          </p:cNvPr>
+          <p:cNvSpPr txBox="1"/>
+          <p:nvPr/>
+        </p:nvSpPr>
+        <p:spPr>
+          <a:xfrm>
+            <a:off x="1066800" y="3429000"/>
+            <a:ext cx="1828800" cy="369332"/>
+          </a:xfrm>
+          <a:prstGeom prst="rect">
+            <a:avLst/>
+          </a:prstGeom>
+          <a:noFill/>
+        </p:spPr>
+        <p:txBody>
+          <a:bodyPr wrap="square" rtlCol="0">
+            <a:spAutoFit/>
+          </a:bodyPr>
+          <a:lstStyle/>
+          <a:p>
+            <a:pPr algn="r"/>
+            <a:r>
+              <a:rPr lang="en-US" dirty="0"/>
+              <a:t>Right</a:t>
+            </a:r>
+          </a:p>
+        </p:txBody>
+      </p:sp>
+      <p:sp>
+        <p:nvSpPr>
+          <p:cNvPr id="10" name="Justify source">
+            <a:extLst>
+              <a:ext uri="{FF2B5EF4-FFF2-40B4-BE49-F238E27FC236}">
+                <a16:creationId xmlns:a16="http://schemas.microsoft.com/office/drawing/2014/main" id="{C258C011-B9B9-430F-842E-E6EDDCCAF93B}"/>
+              </a:ext>
+            </a:extLst>
+          </p:cNvPr>
+          <p:cNvSpPr txBox="1"/>
+          <p:nvPr/>
+        </p:nvSpPr>
+        <p:spPr>
+          <a:xfrm>
+            <a:off x="1052945" y="4888469"/>
+            <a:ext cx="1828800" cy="369332"/>
+          </a:xfrm>
+          <a:prstGeom prst="rect">
+            <a:avLst/>
+          </a:prstGeom>
+          <a:noFill/>
+        </p:spPr>
+        <p:txBody>
+          <a:bodyPr wrap="square" rtlCol="0">
+            <a:spAutoFit/>
+          </a:bodyPr>
+          <a:lstStyle/>
+          <a:p>
+            <a:pPr algn="just"/>
+            <a:r>
+              <a:rPr lang="en-US" dirty="0"/>
+              <a:t>Justify</a:t>
+            </a:r>
+          </a:p>
+        </p:txBody>
+      </p:sp>
+      <p:sp>
+        <p:nvSpPr>
+          <p:cNvPr id="11" name="Left target">
+            <a:extLst>
+              <a:ext uri="{FF2B5EF4-FFF2-40B4-BE49-F238E27FC236}">
+                <a16:creationId xmlns:a16="http://schemas.microsoft.com/office/drawing/2014/main" id="{D8949655-9B3E-4FCA-947F-2A70F9AE41AA}"/>
+              </a:ext>
+            </a:extLst>
+          </p:cNvPr>
+          <p:cNvSpPr txBox="1"/>
+          <p:nvPr/>
+        </p:nvSpPr>
+        <p:spPr>
+          <a:xfrm>
+            <a:off x="5867400" y="990600"/>
+            <a:ext cx="1828800" cy="369332"/>
+          </a:xfrm>
+          <a:prstGeom prst="rect">
+            <a:avLst/>
+          </a:prstGeom>
+          <a:noFill/>
+        </p:spPr>
+        <p:txBody>
+          <a:bodyPr wrap="square" rtlCol="0">
+            <a:spAutoFit/>
+          </a:bodyPr>
+          <a:lstStyle/>
+          <a:p>
+            <a:r>
+              <a:rPr lang="en-US" b="1" dirty="0"/>
+              <a:t>Left</a:t>
+            </a:r>
+          </a:p>
+        </p:txBody>
+      </p:sp>
+      <p:sp>
+        <p:nvSpPr>
+          <p:cNvPr id="12" name="Center target">
+            <a:extLst>
+              <a:ext uri="{FF2B5EF4-FFF2-40B4-BE49-F238E27FC236}">
+                <a16:creationId xmlns:a16="http://schemas.microsoft.com/office/drawing/2014/main" id="{BB7371B5-9FD6-4124-84D9-AD9E6AEC7EB6}"/>
+              </a:ext>
+            </a:extLst>
+          </p:cNvPr>
+          <p:cNvSpPr txBox="1"/>
+          <p:nvPr/>
+        </p:nvSpPr>
+        <p:spPr>
+          <a:xfrm>
+            <a:off x="5867400" y="2209800"/>
+            <a:ext cx="1828800" cy="369332"/>
+          </a:xfrm>
+          <a:prstGeom prst="rect">
+            <a:avLst/>
+          </a:prstGeom>
+          <a:noFill/>
+        </p:spPr>
+        <p:txBody>
+          <a:bodyPr wrap="square" rtlCol="0">
+            <a:spAutoFit/>
+          </a:bodyPr>
+          <a:lstStyle/>
+          <a:p>
+            <a:pPr algn="ctr"/>
+            <a:r>
+              <a:rPr lang="en-US" b="1" dirty="0"/>
+              <a:t>Center</a:t>
+            </a:r>
+          </a:p>
+        </p:txBody>
+      </p:sp>
+      <p:sp>
+        <p:nvSpPr>
+          <p:cNvPr id="13" name="Right target">
+            <a:extLst>
+              <a:ext uri="{FF2B5EF4-FFF2-40B4-BE49-F238E27FC236}">
+                <a16:creationId xmlns:a16="http://schemas.microsoft.com/office/drawing/2014/main" id="{0A371897-5C3C-453A-81E9-DF58C0EE8364}"/>
+              </a:ext>
+            </a:extLst>
+          </p:cNvPr>
+          <p:cNvSpPr txBox="1"/>
+          <p:nvPr/>
+        </p:nvSpPr>
+        <p:spPr>
+          <a:xfrm>
+            <a:off x="5867400" y="3429000"/>
+            <a:ext cx="1828800" cy="369332"/>
+          </a:xfrm>
+          <a:prstGeom prst="rect">
+            <a:avLst/>
+          </a:prstGeom>
+          <a:noFill/>
+        </p:spPr>
+        <p:txBody>
+          <a:bodyPr wrap="square" rtlCol="0">
+            <a:spAutoFit/>
+          </a:bodyPr>
+          <a:lstStyle/>
+          <a:p>
+            <a:pPr algn="r"/>
+            <a:r>
+              <a:rPr lang="en-US" b="1" dirty="0"/>
+              <a:t>Right</a:t>
+            </a:r>
+          </a:p>
+        </p:txBody>
+      </p:sp>
+      <p:sp>
+        <p:nvSpPr>
+          <p:cNvPr id="14" name="Justify target">
+            <a:extLst>
+              <a:ext uri="{FF2B5EF4-FFF2-40B4-BE49-F238E27FC236}">
+                <a16:creationId xmlns:a16="http://schemas.microsoft.com/office/drawing/2014/main" id="{5AC33D6C-4CC2-470D-8F70-0ECF7236B11E}"/>
+              </a:ext>
+            </a:extLst>
+          </p:cNvPr>
+          <p:cNvSpPr txBox="1"/>
+          <p:nvPr/>
+        </p:nvSpPr>
+        <p:spPr>
+          <a:xfrm>
+            <a:off x="5853545" y="4888469"/>
+            <a:ext cx="1828800" cy="369332"/>
+          </a:xfrm>
+          <a:prstGeom prst="rect">
+            <a:avLst/>
+          </a:prstGeom>
+          <a:noFill/>
+        </p:spPr>
+        <p:txBody>
+          <a:bodyPr wrap="square" rtlCol="0">
+            <a:spAutoFit/>
+          </a:bodyPr>
+          <a:lstStyle/>
+          <a:p>
+            <a:pPr algn="just"/>
+            <a:r>
+              <a:rPr lang="en-US" b="1" dirty="0"/>
+              <a:t>Justify</a:t>
+            </a:r>
+          </a:p>
+        </p:txBody>
+      </p:sp>
+    </p:spTree>
+    <p:extLst>
+      <p:ext uri="{BB962C8B-B14F-4D97-AF65-F5344CB8AC3E}">
+        <p14:creationId xmlns:p14="http://schemas.microsoft.com/office/powerpoint/2010/main" val="543301213"/>
+      </p:ext>
+    </p:extLst>
+  </p:cSld>
+  <p:clrMapOvr>
+    <a:masterClrMapping/>
+  </p:clrMapOvr>
+</p:sld>
+</file>
+
+<file path=ppt/slides/slide6.xml><?xml version="1.0" encoding="utf-8"?>
+<p:sld xmlns:a="http://schemas.openxmlformats.org/drawingml/2006/main" xmlns:r="http://schemas.openxmlformats.org/officeDocument/2006/relationships" xmlns:p="http://schemas.openxmlformats.org/presentationml/2006/main">
+  <p:cSld>
+    <p:spTree>
+      <p:nvGrpSpPr>
+        <p:cNvPr id="1" name=""/>
+        <p:cNvGrpSpPr/>
+        <p:nvPr/>
+      </p:nvGrpSpPr>
+      <p:grpSpPr>
+        <a:xfrm>
+          <a:off x="0" y="0"/>
+          <a:ext cx="0" cy="0"/>
+          <a:chOff x="0" y="0"/>
+          <a:chExt cx="0" cy="0"/>
+        </a:xfrm>
+      </p:grpSpPr>
+      <p:sp>
+        <p:nvSpPr>
+          <p:cNvPr id="15" name="Top source">
             <a:extLst>
               <a:ext uri="{FF2B5EF4-FFF2-40B4-BE49-F238E27FC236}">
                 <a16:creationId xmlns:a16="http://schemas.microsoft.com/office/drawing/2014/main" id="{DB890110-AB98-42E0-8129-A60AD8C2D1C9}"/>
@@ -13259,7 +13753,7 @@
       </p:sp>
       <p:sp>
         <p:nvSpPr>
-          <p:cNvPr id="16" name="Content Placeholder 2">
+          <p:cNvPr id="16" name="Middle source">
             <a:extLst>
               <a:ext uri="{FF2B5EF4-FFF2-40B4-BE49-F238E27FC236}">
                 <a16:creationId xmlns:a16="http://schemas.microsoft.com/office/drawing/2014/main" id="{C5FACBA1-4042-4474-92AB-BBB062DCD83B}"/>
@@ -13435,7 +13929,7 @@
       </p:sp>
       <p:sp>
         <p:nvSpPr>
-          <p:cNvPr id="17" name="Content Placeholder 2">
+          <p:cNvPr id="17" name="Bottom source">
             <a:extLst>
               <a:ext uri="{FF2B5EF4-FFF2-40B4-BE49-F238E27FC236}">
                 <a16:creationId xmlns:a16="http://schemas.microsoft.com/office/drawing/2014/main" id="{72286D81-C364-462E-9A7C-4F4D6F9DFB0A}"/>
@@ -13611,7 +14105,7 @@
       </p:sp>
       <p:sp>
         <p:nvSpPr>
-          <p:cNvPr id="18" name="Content Placeholder 2">
+          <p:cNvPr id="18" name="Top target">
             <a:extLst>
               <a:ext uri="{FF2B5EF4-FFF2-40B4-BE49-F238E27FC236}">
                 <a16:creationId xmlns:a16="http://schemas.microsoft.com/office/drawing/2014/main" id="{EDC3C9E3-B54C-49C1-B8D4-172BFE422A13}"/>
@@ -13787,7 +14281,7 @@
       </p:sp>
       <p:sp>
         <p:nvSpPr>
-          <p:cNvPr id="19" name="Content Placeholder 2">
+          <p:cNvPr id="19" name="Middle target">
             <a:extLst>
               <a:ext uri="{FF2B5EF4-FFF2-40B4-BE49-F238E27FC236}">
                 <a16:creationId xmlns:a16="http://schemas.microsoft.com/office/drawing/2014/main" id="{EC4CC770-E30C-4AFF-AD28-9E5991ED7413}"/>
@@ -13963,7 +14457,7 @@
       </p:sp>
       <p:sp>
         <p:nvSpPr>
-          <p:cNvPr id="20" name="Content Placeholder 2">
+          <p:cNvPr id="20" name="Bottom target">
             <a:extLst>
               <a:ext uri="{FF2B5EF4-FFF2-40B4-BE49-F238E27FC236}">
                 <a16:creationId xmlns:a16="http://schemas.microsoft.com/office/drawing/2014/main" id="{EAA12224-BB9B-4DDE-B8E2-A980FB73A36D}"/>
@@ -14141,6 +14635,952 @@
     <p:extLst>
       <p:ext uri="{BB962C8B-B14F-4D97-AF65-F5344CB8AC3E}">
         <p14:creationId xmlns:p14="http://schemas.microsoft.com/office/powerpoint/2010/main" val="739264417"/>
+      </p:ext>
+    </p:extLst>
+  </p:cSld>
+  <p:clrMapOvr>
+    <a:masterClrMapping/>
+  </p:clrMapOvr>
+</p:sld>
+</file>
+
+<file path=ppt/slides/slide7.xml><?xml version="1.0" encoding="utf-8"?>
+<p:sld xmlns:a="http://schemas.openxmlformats.org/drawingml/2006/main" xmlns:r="http://schemas.openxmlformats.org/officeDocument/2006/relationships" xmlns:p="http://schemas.openxmlformats.org/presentationml/2006/main">
+  <p:cSld>
+    <p:spTree>
+      <p:nvGrpSpPr>
+        <p:cNvPr id="1" name=""/>
+        <p:cNvGrpSpPr/>
+        <p:nvPr/>
+      </p:nvGrpSpPr>
+      <p:grpSpPr>
+        <a:xfrm>
+          <a:off x="0" y="0"/>
+          <a:ext cx="0" cy="0"/>
+          <a:chOff x="0" y="0"/>
+          <a:chExt cx="0" cy="0"/>
+        </a:xfrm>
+      </p:grpSpPr>
+      <p:sp>
+        <p:nvSpPr>
+          <p:cNvPr id="15" name="Top source">
+            <a:extLst>
+              <a:ext uri="{FF2B5EF4-FFF2-40B4-BE49-F238E27FC236}">
+                <a16:creationId xmlns:a16="http://schemas.microsoft.com/office/drawing/2014/main" id="{DB890110-AB98-42E0-8129-A60AD8C2D1C9}"/>
+              </a:ext>
+            </a:extLst>
+          </p:cNvPr>
+          <p:cNvSpPr>
+            <a:spLocks noGrp="1"/>
+          </p:cNvSpPr>
+          <p:nvPr>
+            <p:ph idx="1"/>
+          </p:nvPr>
+        </p:nvSpPr>
+        <p:spPr>
+          <a:xfrm>
+            <a:off x="533400" y="1066800"/>
+            <a:ext cx="2667000" cy="1371600"/>
+          </a:xfrm>
+        </p:spPr>
+        <p:txBody>
+          <a:bodyPr/>
+          <a:lstStyle/>
+          <a:p>
+            <a:pPr marL="0" indent="0">
+              <a:buNone/>
+            </a:pPr>
+            <a:r>
+              <a:rPr lang="en-SG" dirty="0"/>
+              <a:t>Top</a:t>
+            </a:r>
+          </a:p>
+        </p:txBody>
+      </p:sp>
+      <p:sp>
+        <p:nvSpPr>
+          <p:cNvPr id="16" name="Middle source">
+            <a:extLst>
+              <a:ext uri="{FF2B5EF4-FFF2-40B4-BE49-F238E27FC236}">
+                <a16:creationId xmlns:a16="http://schemas.microsoft.com/office/drawing/2014/main" id="{C5FACBA1-4042-4474-92AB-BBB062DCD83B}"/>
+              </a:ext>
+            </a:extLst>
+          </p:cNvPr>
+          <p:cNvSpPr txBox="1">
+            <a:spLocks/>
+          </p:cNvSpPr>
+          <p:nvPr/>
+        </p:nvSpPr>
+        <p:spPr>
+          <a:xfrm>
+            <a:off x="546265" y="2743200"/>
+            <a:ext cx="2667000" cy="1371600"/>
+          </a:xfrm>
+          <a:prstGeom prst="rect">
+            <a:avLst/>
+          </a:prstGeom>
+        </p:spPr>
+        <p:txBody>
+          <a:bodyPr vert="horz" lIns="91440" tIns="45720" rIns="91440" bIns="45720" rtlCol="0" anchor="ctr" anchorCtr="0">
+            <a:normAutofit/>
+          </a:bodyPr>
+          <a:lstStyle>
+            <a:lvl1pPr marL="342900" indent="-342900" algn="l" defTabSz="914400" rtl="0" eaLnBrk="1" latinLnBrk="0" hangingPunct="1">
+              <a:spcBef>
+                <a:spcPct val="20000"/>
+              </a:spcBef>
+              <a:buFont typeface="Arial" pitchFamily="34" charset="0"/>
+              <a:buChar char="•"/>
+              <a:defRPr sz="3200" kern="1200">
+                <a:solidFill>
+                  <a:schemeClr val="tx1"/>
+                </a:solidFill>
+                <a:latin typeface="+mn-lt"/>
+                <a:ea typeface="+mn-ea"/>
+                <a:cs typeface="+mn-cs"/>
+              </a:defRPr>
+            </a:lvl1pPr>
+            <a:lvl2pPr marL="742950" indent="-285750" algn="l" defTabSz="914400" rtl="0" eaLnBrk="1" latinLnBrk="0" hangingPunct="1">
+              <a:spcBef>
+                <a:spcPct val="20000"/>
+              </a:spcBef>
+              <a:buFont typeface="Arial" pitchFamily="34" charset="0"/>
+              <a:buChar char="–"/>
+              <a:defRPr sz="2800" kern="1200">
+                <a:solidFill>
+                  <a:schemeClr val="tx1"/>
+                </a:solidFill>
+                <a:latin typeface="+mn-lt"/>
+                <a:ea typeface="+mn-ea"/>
+                <a:cs typeface="+mn-cs"/>
+              </a:defRPr>
+            </a:lvl2pPr>
+            <a:lvl3pPr marL="1143000" indent="-228600" algn="l" defTabSz="914400" rtl="0" eaLnBrk="1" latinLnBrk="0" hangingPunct="1">
+              <a:spcBef>
+                <a:spcPct val="20000"/>
+              </a:spcBef>
+              <a:buFont typeface="Arial" pitchFamily="34" charset="0"/>
+              <a:buChar char="•"/>
+              <a:defRPr sz="2400" kern="1200">
+                <a:solidFill>
+                  <a:schemeClr val="tx1"/>
+                </a:solidFill>
+                <a:latin typeface="+mn-lt"/>
+                <a:ea typeface="+mn-ea"/>
+                <a:cs typeface="+mn-cs"/>
+              </a:defRPr>
+            </a:lvl3pPr>
+            <a:lvl4pPr marL="1600200" indent="-228600" algn="l" defTabSz="914400" rtl="0" eaLnBrk="1" latinLnBrk="0" hangingPunct="1">
+              <a:spcBef>
+                <a:spcPct val="20000"/>
+              </a:spcBef>
+              <a:buFont typeface="Arial" pitchFamily="34" charset="0"/>
+              <a:buChar char="–"/>
+              <a:defRPr sz="2000" kern="1200">
+                <a:solidFill>
+                  <a:schemeClr val="tx1"/>
+                </a:solidFill>
+                <a:latin typeface="+mn-lt"/>
+                <a:ea typeface="+mn-ea"/>
+                <a:cs typeface="+mn-cs"/>
+              </a:defRPr>
+            </a:lvl4pPr>
+            <a:lvl5pPr marL="2057400" indent="-228600" algn="l" defTabSz="914400" rtl="0" eaLnBrk="1" latinLnBrk="0" hangingPunct="1">
+              <a:spcBef>
+                <a:spcPct val="20000"/>
+              </a:spcBef>
+              <a:buFont typeface="Arial" pitchFamily="34" charset="0"/>
+              <a:buChar char="»"/>
+              <a:defRPr sz="2000" kern="1200">
+                <a:solidFill>
+                  <a:schemeClr val="tx1"/>
+                </a:solidFill>
+                <a:latin typeface="+mn-lt"/>
+                <a:ea typeface="+mn-ea"/>
+                <a:cs typeface="+mn-cs"/>
+              </a:defRPr>
+            </a:lvl5pPr>
+            <a:lvl6pPr marL="2514600" indent="-228600" algn="l" defTabSz="914400" rtl="0" eaLnBrk="1" latinLnBrk="0" hangingPunct="1">
+              <a:spcBef>
+                <a:spcPct val="20000"/>
+              </a:spcBef>
+              <a:buFont typeface="Arial" pitchFamily="34" charset="0"/>
+              <a:buChar char="•"/>
+              <a:defRPr sz="2000" kern="1200">
+                <a:solidFill>
+                  <a:schemeClr val="tx1"/>
+                </a:solidFill>
+                <a:latin typeface="+mn-lt"/>
+                <a:ea typeface="+mn-ea"/>
+                <a:cs typeface="+mn-cs"/>
+              </a:defRPr>
+            </a:lvl6pPr>
+            <a:lvl7pPr marL="2971800" indent="-228600" algn="l" defTabSz="914400" rtl="0" eaLnBrk="1" latinLnBrk="0" hangingPunct="1">
+              <a:spcBef>
+                <a:spcPct val="20000"/>
+              </a:spcBef>
+              <a:buFont typeface="Arial" pitchFamily="34" charset="0"/>
+              <a:buChar char="•"/>
+              <a:defRPr sz="2000" kern="1200">
+                <a:solidFill>
+                  <a:schemeClr val="tx1"/>
+                </a:solidFill>
+                <a:latin typeface="+mn-lt"/>
+                <a:ea typeface="+mn-ea"/>
+                <a:cs typeface="+mn-cs"/>
+              </a:defRPr>
+            </a:lvl7pPr>
+            <a:lvl8pPr marL="3429000" indent="-228600" algn="l" defTabSz="914400" rtl="0" eaLnBrk="1" latinLnBrk="0" hangingPunct="1">
+              <a:spcBef>
+                <a:spcPct val="20000"/>
+              </a:spcBef>
+              <a:buFont typeface="Arial" pitchFamily="34" charset="0"/>
+              <a:buChar char="•"/>
+              <a:defRPr sz="2000" kern="1200">
+                <a:solidFill>
+                  <a:schemeClr val="tx1"/>
+                </a:solidFill>
+                <a:latin typeface="+mn-lt"/>
+                <a:ea typeface="+mn-ea"/>
+                <a:cs typeface="+mn-cs"/>
+              </a:defRPr>
+            </a:lvl8pPr>
+            <a:lvl9pPr marL="3886200" indent="-228600" algn="l" defTabSz="914400" rtl="0" eaLnBrk="1" latinLnBrk="0" hangingPunct="1">
+              <a:spcBef>
+                <a:spcPct val="20000"/>
+              </a:spcBef>
+              <a:buFont typeface="Arial" pitchFamily="34" charset="0"/>
+              <a:buChar char="•"/>
+              <a:defRPr sz="2000" kern="1200">
+                <a:solidFill>
+                  <a:schemeClr val="tx1"/>
+                </a:solidFill>
+                <a:latin typeface="+mn-lt"/>
+                <a:ea typeface="+mn-ea"/>
+                <a:cs typeface="+mn-cs"/>
+              </a:defRPr>
+            </a:lvl9pPr>
+          </a:lstStyle>
+          <a:p>
+            <a:pPr marL="0" indent="0">
+              <a:buFont typeface="Arial" pitchFamily="34" charset="0"/>
+              <a:buNone/>
+            </a:pPr>
+            <a:r>
+              <a:rPr lang="en-SG" dirty="0"/>
+              <a:t>Middle</a:t>
+            </a:r>
+          </a:p>
+        </p:txBody>
+      </p:sp>
+      <p:sp>
+        <p:nvSpPr>
+          <p:cNvPr id="17" name="Bottom source">
+            <a:extLst>
+              <a:ext uri="{FF2B5EF4-FFF2-40B4-BE49-F238E27FC236}">
+                <a16:creationId xmlns:a16="http://schemas.microsoft.com/office/drawing/2014/main" id="{72286D81-C364-462E-9A7C-4F4D6F9DFB0A}"/>
+              </a:ext>
+            </a:extLst>
+          </p:cNvPr>
+          <p:cNvSpPr txBox="1">
+            <a:spLocks/>
+          </p:cNvSpPr>
+          <p:nvPr/>
+        </p:nvSpPr>
+        <p:spPr>
+          <a:xfrm>
+            <a:off x="533400" y="4419600"/>
+            <a:ext cx="2667000" cy="1371600"/>
+          </a:xfrm>
+          <a:prstGeom prst="rect">
+            <a:avLst/>
+          </a:prstGeom>
+        </p:spPr>
+        <p:txBody>
+          <a:bodyPr vert="horz" lIns="91440" tIns="45720" rIns="91440" bIns="45720" rtlCol="0" anchor="b" anchorCtr="0">
+            <a:normAutofit/>
+          </a:bodyPr>
+          <a:lstStyle>
+            <a:lvl1pPr marL="342900" indent="-342900" algn="l" defTabSz="914400" rtl="0" eaLnBrk="1" latinLnBrk="0" hangingPunct="1">
+              <a:spcBef>
+                <a:spcPct val="20000"/>
+              </a:spcBef>
+              <a:buFont typeface="Arial" pitchFamily="34" charset="0"/>
+              <a:buChar char="•"/>
+              <a:defRPr sz="3200" kern="1200">
+                <a:solidFill>
+                  <a:schemeClr val="tx1"/>
+                </a:solidFill>
+                <a:latin typeface="+mn-lt"/>
+                <a:ea typeface="+mn-ea"/>
+                <a:cs typeface="+mn-cs"/>
+              </a:defRPr>
+            </a:lvl1pPr>
+            <a:lvl2pPr marL="742950" indent="-285750" algn="l" defTabSz="914400" rtl="0" eaLnBrk="1" latinLnBrk="0" hangingPunct="1">
+              <a:spcBef>
+                <a:spcPct val="20000"/>
+              </a:spcBef>
+              <a:buFont typeface="Arial" pitchFamily="34" charset="0"/>
+              <a:buChar char="–"/>
+              <a:defRPr sz="2800" kern="1200">
+                <a:solidFill>
+                  <a:schemeClr val="tx1"/>
+                </a:solidFill>
+                <a:latin typeface="+mn-lt"/>
+                <a:ea typeface="+mn-ea"/>
+                <a:cs typeface="+mn-cs"/>
+              </a:defRPr>
+            </a:lvl2pPr>
+            <a:lvl3pPr marL="1143000" indent="-228600" algn="l" defTabSz="914400" rtl="0" eaLnBrk="1" latinLnBrk="0" hangingPunct="1">
+              <a:spcBef>
+                <a:spcPct val="20000"/>
+              </a:spcBef>
+              <a:buFont typeface="Arial" pitchFamily="34" charset="0"/>
+              <a:buChar char="•"/>
+              <a:defRPr sz="2400" kern="1200">
+                <a:solidFill>
+                  <a:schemeClr val="tx1"/>
+                </a:solidFill>
+                <a:latin typeface="+mn-lt"/>
+                <a:ea typeface="+mn-ea"/>
+                <a:cs typeface="+mn-cs"/>
+              </a:defRPr>
+            </a:lvl3pPr>
+            <a:lvl4pPr marL="1600200" indent="-228600" algn="l" defTabSz="914400" rtl="0" eaLnBrk="1" latinLnBrk="0" hangingPunct="1">
+              <a:spcBef>
+                <a:spcPct val="20000"/>
+              </a:spcBef>
+              <a:buFont typeface="Arial" pitchFamily="34" charset="0"/>
+              <a:buChar char="–"/>
+              <a:defRPr sz="2000" kern="1200">
+                <a:solidFill>
+                  <a:schemeClr val="tx1"/>
+                </a:solidFill>
+                <a:latin typeface="+mn-lt"/>
+                <a:ea typeface="+mn-ea"/>
+                <a:cs typeface="+mn-cs"/>
+              </a:defRPr>
+            </a:lvl4pPr>
+            <a:lvl5pPr marL="2057400" indent="-228600" algn="l" defTabSz="914400" rtl="0" eaLnBrk="1" latinLnBrk="0" hangingPunct="1">
+              <a:spcBef>
+                <a:spcPct val="20000"/>
+              </a:spcBef>
+              <a:buFont typeface="Arial" pitchFamily="34" charset="0"/>
+              <a:buChar char="»"/>
+              <a:defRPr sz="2000" kern="1200">
+                <a:solidFill>
+                  <a:schemeClr val="tx1"/>
+                </a:solidFill>
+                <a:latin typeface="+mn-lt"/>
+                <a:ea typeface="+mn-ea"/>
+                <a:cs typeface="+mn-cs"/>
+              </a:defRPr>
+            </a:lvl5pPr>
+            <a:lvl6pPr marL="2514600" indent="-228600" algn="l" defTabSz="914400" rtl="0" eaLnBrk="1" latinLnBrk="0" hangingPunct="1">
+              <a:spcBef>
+                <a:spcPct val="20000"/>
+              </a:spcBef>
+              <a:buFont typeface="Arial" pitchFamily="34" charset="0"/>
+              <a:buChar char="•"/>
+              <a:defRPr sz="2000" kern="1200">
+                <a:solidFill>
+                  <a:schemeClr val="tx1"/>
+                </a:solidFill>
+                <a:latin typeface="+mn-lt"/>
+                <a:ea typeface="+mn-ea"/>
+                <a:cs typeface="+mn-cs"/>
+              </a:defRPr>
+            </a:lvl6pPr>
+            <a:lvl7pPr marL="2971800" indent="-228600" algn="l" defTabSz="914400" rtl="0" eaLnBrk="1" latinLnBrk="0" hangingPunct="1">
+              <a:spcBef>
+                <a:spcPct val="20000"/>
+              </a:spcBef>
+              <a:buFont typeface="Arial" pitchFamily="34" charset="0"/>
+              <a:buChar char="•"/>
+              <a:defRPr sz="2000" kern="1200">
+                <a:solidFill>
+                  <a:schemeClr val="tx1"/>
+                </a:solidFill>
+                <a:latin typeface="+mn-lt"/>
+                <a:ea typeface="+mn-ea"/>
+                <a:cs typeface="+mn-cs"/>
+              </a:defRPr>
+            </a:lvl7pPr>
+            <a:lvl8pPr marL="3429000" indent="-228600" algn="l" defTabSz="914400" rtl="0" eaLnBrk="1" latinLnBrk="0" hangingPunct="1">
+              <a:spcBef>
+                <a:spcPct val="20000"/>
+              </a:spcBef>
+              <a:buFont typeface="Arial" pitchFamily="34" charset="0"/>
+              <a:buChar char="•"/>
+              <a:defRPr sz="2000" kern="1200">
+                <a:solidFill>
+                  <a:schemeClr val="tx1"/>
+                </a:solidFill>
+                <a:latin typeface="+mn-lt"/>
+                <a:ea typeface="+mn-ea"/>
+                <a:cs typeface="+mn-cs"/>
+              </a:defRPr>
+            </a:lvl8pPr>
+            <a:lvl9pPr marL="3886200" indent="-228600" algn="l" defTabSz="914400" rtl="0" eaLnBrk="1" latinLnBrk="0" hangingPunct="1">
+              <a:spcBef>
+                <a:spcPct val="20000"/>
+              </a:spcBef>
+              <a:buFont typeface="Arial" pitchFamily="34" charset="0"/>
+              <a:buChar char="•"/>
+              <a:defRPr sz="2000" kern="1200">
+                <a:solidFill>
+                  <a:schemeClr val="tx1"/>
+                </a:solidFill>
+                <a:latin typeface="+mn-lt"/>
+                <a:ea typeface="+mn-ea"/>
+                <a:cs typeface="+mn-cs"/>
+              </a:defRPr>
+            </a:lvl9pPr>
+          </a:lstStyle>
+          <a:p>
+            <a:pPr marL="0" indent="0">
+              <a:buFont typeface="Arial" pitchFamily="34" charset="0"/>
+              <a:buNone/>
+            </a:pPr>
+            <a:r>
+              <a:rPr lang="en-SG" dirty="0"/>
+              <a:t>Bottom</a:t>
+            </a:r>
+          </a:p>
+        </p:txBody>
+      </p:sp>
+      <p:sp>
+        <p:nvSpPr>
+          <p:cNvPr id="18" name="Top target">
+            <a:extLst>
+              <a:ext uri="{FF2B5EF4-FFF2-40B4-BE49-F238E27FC236}">
+                <a16:creationId xmlns:a16="http://schemas.microsoft.com/office/drawing/2014/main" id="{EDC3C9E3-B54C-49C1-B8D4-172BFE422A13}"/>
+              </a:ext>
+            </a:extLst>
+          </p:cNvPr>
+          <p:cNvSpPr txBox="1">
+            <a:spLocks/>
+          </p:cNvSpPr>
+          <p:nvPr/>
+        </p:nvSpPr>
+        <p:spPr>
+          <a:xfrm>
+            <a:off x="5791200" y="1066800"/>
+            <a:ext cx="2667000" cy="1371600"/>
+          </a:xfrm>
+          <a:prstGeom prst="rect">
+            <a:avLst/>
+          </a:prstGeom>
+        </p:spPr>
+        <p:txBody>
+          <a:bodyPr vert="horz" lIns="91440" tIns="45720" rIns="91440" bIns="45720" rtlCol="0" anchor="t" anchorCtr="0">
+            <a:normAutofit/>
+          </a:bodyPr>
+          <a:lstStyle>
+            <a:lvl1pPr marL="342900" indent="-342900" algn="l" defTabSz="914400" rtl="0" eaLnBrk="1" latinLnBrk="0" hangingPunct="1">
+              <a:spcBef>
+                <a:spcPct val="20000"/>
+              </a:spcBef>
+              <a:buFont typeface="Arial" pitchFamily="34" charset="0"/>
+              <a:buChar char="•"/>
+              <a:defRPr sz="3200" kern="1200">
+                <a:solidFill>
+                  <a:schemeClr val="tx1"/>
+                </a:solidFill>
+                <a:latin typeface="+mn-lt"/>
+                <a:ea typeface="+mn-ea"/>
+                <a:cs typeface="+mn-cs"/>
+              </a:defRPr>
+            </a:lvl1pPr>
+            <a:lvl2pPr marL="742950" indent="-285750" algn="l" defTabSz="914400" rtl="0" eaLnBrk="1" latinLnBrk="0" hangingPunct="1">
+              <a:spcBef>
+                <a:spcPct val="20000"/>
+              </a:spcBef>
+              <a:buFont typeface="Arial" pitchFamily="34" charset="0"/>
+              <a:buChar char="–"/>
+              <a:defRPr sz="2800" kern="1200">
+                <a:solidFill>
+                  <a:schemeClr val="tx1"/>
+                </a:solidFill>
+                <a:latin typeface="+mn-lt"/>
+                <a:ea typeface="+mn-ea"/>
+                <a:cs typeface="+mn-cs"/>
+              </a:defRPr>
+            </a:lvl2pPr>
+            <a:lvl3pPr marL="1143000" indent="-228600" algn="l" defTabSz="914400" rtl="0" eaLnBrk="1" latinLnBrk="0" hangingPunct="1">
+              <a:spcBef>
+                <a:spcPct val="20000"/>
+              </a:spcBef>
+              <a:buFont typeface="Arial" pitchFamily="34" charset="0"/>
+              <a:buChar char="•"/>
+              <a:defRPr sz="2400" kern="1200">
+                <a:solidFill>
+                  <a:schemeClr val="tx1"/>
+                </a:solidFill>
+                <a:latin typeface="+mn-lt"/>
+                <a:ea typeface="+mn-ea"/>
+                <a:cs typeface="+mn-cs"/>
+              </a:defRPr>
+            </a:lvl3pPr>
+            <a:lvl4pPr marL="1600200" indent="-228600" algn="l" defTabSz="914400" rtl="0" eaLnBrk="1" latinLnBrk="0" hangingPunct="1">
+              <a:spcBef>
+                <a:spcPct val="20000"/>
+              </a:spcBef>
+              <a:buFont typeface="Arial" pitchFamily="34" charset="0"/>
+              <a:buChar char="–"/>
+              <a:defRPr sz="2000" kern="1200">
+                <a:solidFill>
+                  <a:schemeClr val="tx1"/>
+                </a:solidFill>
+                <a:latin typeface="+mn-lt"/>
+                <a:ea typeface="+mn-ea"/>
+                <a:cs typeface="+mn-cs"/>
+              </a:defRPr>
+            </a:lvl4pPr>
+            <a:lvl5pPr marL="2057400" indent="-228600" algn="l" defTabSz="914400" rtl="0" eaLnBrk="1" latinLnBrk="0" hangingPunct="1">
+              <a:spcBef>
+                <a:spcPct val="20000"/>
+              </a:spcBef>
+              <a:buFont typeface="Arial" pitchFamily="34" charset="0"/>
+              <a:buChar char="»"/>
+              <a:defRPr sz="2000" kern="1200">
+                <a:solidFill>
+                  <a:schemeClr val="tx1"/>
+                </a:solidFill>
+                <a:latin typeface="+mn-lt"/>
+                <a:ea typeface="+mn-ea"/>
+                <a:cs typeface="+mn-cs"/>
+              </a:defRPr>
+            </a:lvl5pPr>
+            <a:lvl6pPr marL="2514600" indent="-228600" algn="l" defTabSz="914400" rtl="0" eaLnBrk="1" latinLnBrk="0" hangingPunct="1">
+              <a:spcBef>
+                <a:spcPct val="20000"/>
+              </a:spcBef>
+              <a:buFont typeface="Arial" pitchFamily="34" charset="0"/>
+              <a:buChar char="•"/>
+              <a:defRPr sz="2000" kern="1200">
+                <a:solidFill>
+                  <a:schemeClr val="tx1"/>
+                </a:solidFill>
+                <a:latin typeface="+mn-lt"/>
+                <a:ea typeface="+mn-ea"/>
+                <a:cs typeface="+mn-cs"/>
+              </a:defRPr>
+            </a:lvl6pPr>
+            <a:lvl7pPr marL="2971800" indent="-228600" algn="l" defTabSz="914400" rtl="0" eaLnBrk="1" latinLnBrk="0" hangingPunct="1">
+              <a:spcBef>
+                <a:spcPct val="20000"/>
+              </a:spcBef>
+              <a:buFont typeface="Arial" pitchFamily="34" charset="0"/>
+              <a:buChar char="•"/>
+              <a:defRPr sz="2000" kern="1200">
+                <a:solidFill>
+                  <a:schemeClr val="tx1"/>
+                </a:solidFill>
+                <a:latin typeface="+mn-lt"/>
+                <a:ea typeface="+mn-ea"/>
+                <a:cs typeface="+mn-cs"/>
+              </a:defRPr>
+            </a:lvl7pPr>
+            <a:lvl8pPr marL="3429000" indent="-228600" algn="l" defTabSz="914400" rtl="0" eaLnBrk="1" latinLnBrk="0" hangingPunct="1">
+              <a:spcBef>
+                <a:spcPct val="20000"/>
+              </a:spcBef>
+              <a:buFont typeface="Arial" pitchFamily="34" charset="0"/>
+              <a:buChar char="•"/>
+              <a:defRPr sz="2000" kern="1200">
+                <a:solidFill>
+                  <a:schemeClr val="tx1"/>
+                </a:solidFill>
+                <a:latin typeface="+mn-lt"/>
+                <a:ea typeface="+mn-ea"/>
+                <a:cs typeface="+mn-cs"/>
+              </a:defRPr>
+            </a:lvl8pPr>
+            <a:lvl9pPr marL="3886200" indent="-228600" algn="l" defTabSz="914400" rtl="0" eaLnBrk="1" latinLnBrk="0" hangingPunct="1">
+              <a:spcBef>
+                <a:spcPct val="20000"/>
+              </a:spcBef>
+              <a:buFont typeface="Arial" pitchFamily="34" charset="0"/>
+              <a:buChar char="•"/>
+              <a:defRPr sz="2000" kern="1200">
+                <a:solidFill>
+                  <a:schemeClr val="tx1"/>
+                </a:solidFill>
+                <a:latin typeface="+mn-lt"/>
+                <a:ea typeface="+mn-ea"/>
+                <a:cs typeface="+mn-cs"/>
+              </a:defRPr>
+            </a:lvl9pPr>
+          </a:lstStyle>
+          <a:p>
+            <a:pPr marL="0" indent="0" algn="r">
+              <a:buFont typeface="Arial" pitchFamily="34" charset="0"/>
+              <a:buNone/>
+            </a:pPr>
+            <a:r>
+              <a:rPr lang="en-SG" b="1" dirty="0"/>
+              <a:t>Top</a:t>
+            </a:r>
+          </a:p>
+        </p:txBody>
+      </p:sp>
+      <p:sp>
+        <p:nvSpPr>
+          <p:cNvPr id="19" name="Middle target">
+            <a:extLst>
+              <a:ext uri="{FF2B5EF4-FFF2-40B4-BE49-F238E27FC236}">
+                <a16:creationId xmlns:a16="http://schemas.microsoft.com/office/drawing/2014/main" id="{EC4CC770-E30C-4AFF-AD28-9E5991ED7413}"/>
+              </a:ext>
+            </a:extLst>
+          </p:cNvPr>
+          <p:cNvSpPr txBox="1">
+            <a:spLocks/>
+          </p:cNvSpPr>
+          <p:nvPr/>
+        </p:nvSpPr>
+        <p:spPr>
+          <a:xfrm>
+            <a:off x="5804065" y="2743200"/>
+            <a:ext cx="2667000" cy="1371600"/>
+          </a:xfrm>
+          <a:prstGeom prst="rect">
+            <a:avLst/>
+          </a:prstGeom>
+        </p:spPr>
+        <p:txBody>
+          <a:bodyPr vert="horz" lIns="91440" tIns="45720" rIns="91440" bIns="45720" rtlCol="0" anchor="ctr" anchorCtr="0">
+            <a:normAutofit/>
+          </a:bodyPr>
+          <a:lstStyle>
+            <a:lvl1pPr marL="342900" indent="-342900" algn="l" defTabSz="914400" rtl="0" eaLnBrk="1" latinLnBrk="0" hangingPunct="1">
+              <a:spcBef>
+                <a:spcPct val="20000"/>
+              </a:spcBef>
+              <a:buFont typeface="Arial" pitchFamily="34" charset="0"/>
+              <a:buChar char="•"/>
+              <a:defRPr sz="3200" kern="1200">
+                <a:solidFill>
+                  <a:schemeClr val="tx1"/>
+                </a:solidFill>
+                <a:latin typeface="+mn-lt"/>
+                <a:ea typeface="+mn-ea"/>
+                <a:cs typeface="+mn-cs"/>
+              </a:defRPr>
+            </a:lvl1pPr>
+            <a:lvl2pPr marL="742950" indent="-285750" algn="l" defTabSz="914400" rtl="0" eaLnBrk="1" latinLnBrk="0" hangingPunct="1">
+              <a:spcBef>
+                <a:spcPct val="20000"/>
+              </a:spcBef>
+              <a:buFont typeface="Arial" pitchFamily="34" charset="0"/>
+              <a:buChar char="–"/>
+              <a:defRPr sz="2800" kern="1200">
+                <a:solidFill>
+                  <a:schemeClr val="tx1"/>
+                </a:solidFill>
+                <a:latin typeface="+mn-lt"/>
+                <a:ea typeface="+mn-ea"/>
+                <a:cs typeface="+mn-cs"/>
+              </a:defRPr>
+            </a:lvl2pPr>
+            <a:lvl3pPr marL="1143000" indent="-228600" algn="l" defTabSz="914400" rtl="0" eaLnBrk="1" latinLnBrk="0" hangingPunct="1">
+              <a:spcBef>
+                <a:spcPct val="20000"/>
+              </a:spcBef>
+              <a:buFont typeface="Arial" pitchFamily="34" charset="0"/>
+              <a:buChar char="•"/>
+              <a:defRPr sz="2400" kern="1200">
+                <a:solidFill>
+                  <a:schemeClr val="tx1"/>
+                </a:solidFill>
+                <a:latin typeface="+mn-lt"/>
+                <a:ea typeface="+mn-ea"/>
+                <a:cs typeface="+mn-cs"/>
+              </a:defRPr>
+            </a:lvl3pPr>
+            <a:lvl4pPr marL="1600200" indent="-228600" algn="l" defTabSz="914400" rtl="0" eaLnBrk="1" latinLnBrk="0" hangingPunct="1">
+              <a:spcBef>
+                <a:spcPct val="20000"/>
+              </a:spcBef>
+              <a:buFont typeface="Arial" pitchFamily="34" charset="0"/>
+              <a:buChar char="–"/>
+              <a:defRPr sz="2000" kern="1200">
+                <a:solidFill>
+                  <a:schemeClr val="tx1"/>
+                </a:solidFill>
+                <a:latin typeface="+mn-lt"/>
+                <a:ea typeface="+mn-ea"/>
+                <a:cs typeface="+mn-cs"/>
+              </a:defRPr>
+            </a:lvl4pPr>
+            <a:lvl5pPr marL="2057400" indent="-228600" algn="l" defTabSz="914400" rtl="0" eaLnBrk="1" latinLnBrk="0" hangingPunct="1">
+              <a:spcBef>
+                <a:spcPct val="20000"/>
+              </a:spcBef>
+              <a:buFont typeface="Arial" pitchFamily="34" charset="0"/>
+              <a:buChar char="»"/>
+              <a:defRPr sz="2000" kern="1200">
+                <a:solidFill>
+                  <a:schemeClr val="tx1"/>
+                </a:solidFill>
+                <a:latin typeface="+mn-lt"/>
+                <a:ea typeface="+mn-ea"/>
+                <a:cs typeface="+mn-cs"/>
+              </a:defRPr>
+            </a:lvl5pPr>
+            <a:lvl6pPr marL="2514600" indent="-228600" algn="l" defTabSz="914400" rtl="0" eaLnBrk="1" latinLnBrk="0" hangingPunct="1">
+              <a:spcBef>
+                <a:spcPct val="20000"/>
+              </a:spcBef>
+              <a:buFont typeface="Arial" pitchFamily="34" charset="0"/>
+              <a:buChar char="•"/>
+              <a:defRPr sz="2000" kern="1200">
+                <a:solidFill>
+                  <a:schemeClr val="tx1"/>
+                </a:solidFill>
+                <a:latin typeface="+mn-lt"/>
+                <a:ea typeface="+mn-ea"/>
+                <a:cs typeface="+mn-cs"/>
+              </a:defRPr>
+            </a:lvl6pPr>
+            <a:lvl7pPr marL="2971800" indent="-228600" algn="l" defTabSz="914400" rtl="0" eaLnBrk="1" latinLnBrk="0" hangingPunct="1">
+              <a:spcBef>
+                <a:spcPct val="20000"/>
+              </a:spcBef>
+              <a:buFont typeface="Arial" pitchFamily="34" charset="0"/>
+              <a:buChar char="•"/>
+              <a:defRPr sz="2000" kern="1200">
+                <a:solidFill>
+                  <a:schemeClr val="tx1"/>
+                </a:solidFill>
+                <a:latin typeface="+mn-lt"/>
+                <a:ea typeface="+mn-ea"/>
+                <a:cs typeface="+mn-cs"/>
+              </a:defRPr>
+            </a:lvl7pPr>
+            <a:lvl8pPr marL="3429000" indent="-228600" algn="l" defTabSz="914400" rtl="0" eaLnBrk="1" latinLnBrk="0" hangingPunct="1">
+              <a:spcBef>
+                <a:spcPct val="20000"/>
+              </a:spcBef>
+              <a:buFont typeface="Arial" pitchFamily="34" charset="0"/>
+              <a:buChar char="•"/>
+              <a:defRPr sz="2000" kern="1200">
+                <a:solidFill>
+                  <a:schemeClr val="tx1"/>
+                </a:solidFill>
+                <a:latin typeface="+mn-lt"/>
+                <a:ea typeface="+mn-ea"/>
+                <a:cs typeface="+mn-cs"/>
+              </a:defRPr>
+            </a:lvl8pPr>
+            <a:lvl9pPr marL="3886200" indent="-228600" algn="l" defTabSz="914400" rtl="0" eaLnBrk="1" latinLnBrk="0" hangingPunct="1">
+              <a:spcBef>
+                <a:spcPct val="20000"/>
+              </a:spcBef>
+              <a:buFont typeface="Arial" pitchFamily="34" charset="0"/>
+              <a:buChar char="•"/>
+              <a:defRPr sz="2000" kern="1200">
+                <a:solidFill>
+                  <a:schemeClr val="tx1"/>
+                </a:solidFill>
+                <a:latin typeface="+mn-lt"/>
+                <a:ea typeface="+mn-ea"/>
+                <a:cs typeface="+mn-cs"/>
+              </a:defRPr>
+            </a:lvl9pPr>
+          </a:lstStyle>
+          <a:p>
+            <a:pPr marL="0" indent="0" algn="r">
+              <a:buFont typeface="Arial" pitchFamily="34" charset="0"/>
+              <a:buNone/>
+            </a:pPr>
+            <a:r>
+              <a:rPr lang="en-SG" b="1" dirty="0"/>
+              <a:t>Middle</a:t>
+            </a:r>
+          </a:p>
+        </p:txBody>
+      </p:sp>
+      <p:sp>
+        <p:nvSpPr>
+          <p:cNvPr id="20" name="Bottom target">
+            <a:extLst>
+              <a:ext uri="{FF2B5EF4-FFF2-40B4-BE49-F238E27FC236}">
+                <a16:creationId xmlns:a16="http://schemas.microsoft.com/office/drawing/2014/main" id="{EAA12224-BB9B-4DDE-B8E2-A980FB73A36D}"/>
+              </a:ext>
+            </a:extLst>
+          </p:cNvPr>
+          <p:cNvSpPr txBox="1">
+            <a:spLocks/>
+          </p:cNvSpPr>
+          <p:nvPr/>
+        </p:nvSpPr>
+        <p:spPr>
+          <a:xfrm>
+            <a:off x="5791200" y="4419600"/>
+            <a:ext cx="2667000" cy="1371600"/>
+          </a:xfrm>
+          <a:prstGeom prst="rect">
+            <a:avLst/>
+          </a:prstGeom>
+        </p:spPr>
+        <p:txBody>
+          <a:bodyPr vert="horz" lIns="91440" tIns="45720" rIns="91440" bIns="45720" rtlCol="0" anchor="b" anchorCtr="0">
+            <a:normAutofit/>
+          </a:bodyPr>
+          <a:lstStyle>
+            <a:lvl1pPr marL="342900" indent="-342900" algn="l" defTabSz="914400" rtl="0" eaLnBrk="1" latinLnBrk="0" hangingPunct="1">
+              <a:spcBef>
+                <a:spcPct val="20000"/>
+              </a:spcBef>
+              <a:buFont typeface="Arial" pitchFamily="34" charset="0"/>
+              <a:buChar char="•"/>
+              <a:defRPr sz="3200" kern="1200">
+                <a:solidFill>
+                  <a:schemeClr val="tx1"/>
+                </a:solidFill>
+                <a:latin typeface="+mn-lt"/>
+                <a:ea typeface="+mn-ea"/>
+                <a:cs typeface="+mn-cs"/>
+              </a:defRPr>
+            </a:lvl1pPr>
+            <a:lvl2pPr marL="742950" indent="-285750" algn="l" defTabSz="914400" rtl="0" eaLnBrk="1" latinLnBrk="0" hangingPunct="1">
+              <a:spcBef>
+                <a:spcPct val="20000"/>
+              </a:spcBef>
+              <a:buFont typeface="Arial" pitchFamily="34" charset="0"/>
+              <a:buChar char="–"/>
+              <a:defRPr sz="2800" kern="1200">
+                <a:solidFill>
+                  <a:schemeClr val="tx1"/>
+                </a:solidFill>
+                <a:latin typeface="+mn-lt"/>
+                <a:ea typeface="+mn-ea"/>
+                <a:cs typeface="+mn-cs"/>
+              </a:defRPr>
+            </a:lvl2pPr>
+            <a:lvl3pPr marL="1143000" indent="-228600" algn="l" defTabSz="914400" rtl="0" eaLnBrk="1" latinLnBrk="0" hangingPunct="1">
+              <a:spcBef>
+                <a:spcPct val="20000"/>
+              </a:spcBef>
+              <a:buFont typeface="Arial" pitchFamily="34" charset="0"/>
+              <a:buChar char="•"/>
+              <a:defRPr sz="2400" kern="1200">
+                <a:solidFill>
+                  <a:schemeClr val="tx1"/>
+                </a:solidFill>
+                <a:latin typeface="+mn-lt"/>
+                <a:ea typeface="+mn-ea"/>
+                <a:cs typeface="+mn-cs"/>
+              </a:defRPr>
+            </a:lvl3pPr>
+            <a:lvl4pPr marL="1600200" indent="-228600" algn="l" defTabSz="914400" rtl="0" eaLnBrk="1" latinLnBrk="0" hangingPunct="1">
+              <a:spcBef>
+                <a:spcPct val="20000"/>
+              </a:spcBef>
+              <a:buFont typeface="Arial" pitchFamily="34" charset="0"/>
+              <a:buChar char="–"/>
+              <a:defRPr sz="2000" kern="1200">
+                <a:solidFill>
+                  <a:schemeClr val="tx1"/>
+                </a:solidFill>
+                <a:latin typeface="+mn-lt"/>
+                <a:ea typeface="+mn-ea"/>
+                <a:cs typeface="+mn-cs"/>
+              </a:defRPr>
+            </a:lvl4pPr>
+            <a:lvl5pPr marL="2057400" indent="-228600" algn="l" defTabSz="914400" rtl="0" eaLnBrk="1" latinLnBrk="0" hangingPunct="1">
+              <a:spcBef>
+                <a:spcPct val="20000"/>
+              </a:spcBef>
+              <a:buFont typeface="Arial" pitchFamily="34" charset="0"/>
+              <a:buChar char="»"/>
+              <a:defRPr sz="2000" kern="1200">
+                <a:solidFill>
+                  <a:schemeClr val="tx1"/>
+                </a:solidFill>
+                <a:latin typeface="+mn-lt"/>
+                <a:ea typeface="+mn-ea"/>
+                <a:cs typeface="+mn-cs"/>
+              </a:defRPr>
+            </a:lvl5pPr>
+            <a:lvl6pPr marL="2514600" indent="-228600" algn="l" defTabSz="914400" rtl="0" eaLnBrk="1" latinLnBrk="0" hangingPunct="1">
+              <a:spcBef>
+                <a:spcPct val="20000"/>
+              </a:spcBef>
+              <a:buFont typeface="Arial" pitchFamily="34" charset="0"/>
+              <a:buChar char="•"/>
+              <a:defRPr sz="2000" kern="1200">
+                <a:solidFill>
+                  <a:schemeClr val="tx1"/>
+                </a:solidFill>
+                <a:latin typeface="+mn-lt"/>
+                <a:ea typeface="+mn-ea"/>
+                <a:cs typeface="+mn-cs"/>
+              </a:defRPr>
+            </a:lvl6pPr>
+            <a:lvl7pPr marL="2971800" indent="-228600" algn="l" defTabSz="914400" rtl="0" eaLnBrk="1" latinLnBrk="0" hangingPunct="1">
+              <a:spcBef>
+                <a:spcPct val="20000"/>
+              </a:spcBef>
+              <a:buFont typeface="Arial" pitchFamily="34" charset="0"/>
+              <a:buChar char="•"/>
+              <a:defRPr sz="2000" kern="1200">
+                <a:solidFill>
+                  <a:schemeClr val="tx1"/>
+                </a:solidFill>
+                <a:latin typeface="+mn-lt"/>
+                <a:ea typeface="+mn-ea"/>
+                <a:cs typeface="+mn-cs"/>
+              </a:defRPr>
+            </a:lvl7pPr>
+            <a:lvl8pPr marL="3429000" indent="-228600" algn="l" defTabSz="914400" rtl="0" eaLnBrk="1" latinLnBrk="0" hangingPunct="1">
+              <a:spcBef>
+                <a:spcPct val="20000"/>
+              </a:spcBef>
+              <a:buFont typeface="Arial" pitchFamily="34" charset="0"/>
+              <a:buChar char="•"/>
+              <a:defRPr sz="2000" kern="1200">
+                <a:solidFill>
+                  <a:schemeClr val="tx1"/>
+                </a:solidFill>
+                <a:latin typeface="+mn-lt"/>
+                <a:ea typeface="+mn-ea"/>
+                <a:cs typeface="+mn-cs"/>
+              </a:defRPr>
+            </a:lvl8pPr>
+            <a:lvl9pPr marL="3886200" indent="-228600" algn="l" defTabSz="914400" rtl="0" eaLnBrk="1" latinLnBrk="0" hangingPunct="1">
+              <a:spcBef>
+                <a:spcPct val="20000"/>
+              </a:spcBef>
+              <a:buFont typeface="Arial" pitchFamily="34" charset="0"/>
+              <a:buChar char="•"/>
+              <a:defRPr sz="2000" kern="1200">
+                <a:solidFill>
+                  <a:schemeClr val="tx1"/>
+                </a:solidFill>
+                <a:latin typeface="+mn-lt"/>
+                <a:ea typeface="+mn-ea"/>
+                <a:cs typeface="+mn-cs"/>
+              </a:defRPr>
+            </a:lvl9pPr>
+          </a:lstStyle>
+          <a:p>
+            <a:pPr marL="0" indent="0" algn="r">
+              <a:buFont typeface="Arial" pitchFamily="34" charset="0"/>
+              <a:buNone/>
+            </a:pPr>
+            <a:r>
+              <a:rPr lang="en-SG" b="1" dirty="0"/>
+              <a:t>Bottom</a:t>
+            </a:r>
+          </a:p>
+        </p:txBody>
+      </p:sp>
+    </p:spTree>
+    <p:extLst>
+      <p:ext uri="{BB962C8B-B14F-4D97-AF65-F5344CB8AC3E}">
+        <p14:creationId xmlns:p14="http://schemas.microsoft.com/office/powerpoint/2010/main" val="4242314986"/>
       </p:ext>
     </p:extLst>
   </p:cSld>

</xml_diff>

<commit_message>
Complete tests for sync text orientation.
</commit_message>
<xml_diff>
--- a/doc/test/SyncLab/SyncLab_Text.pptx
+++ b/doc/test/SyncLab/SyncLab_Text.pptx
@@ -8,7 +8,7 @@
     <p:sldMasterId id="2147483684" r:id="rId4"/>
   </p:sldMasterIdLst>
   <p:notesMasterIdLst>
-    <p:notesMasterId r:id="rId12"/>
+    <p:notesMasterId r:id="rId15"/>
   </p:notesMasterIdLst>
   <p:sldIdLst>
     <p:sldId id="287" r:id="rId5"/>
@@ -18,6 +18,9 @@
     <p:sldId id="313" r:id="rId9"/>
     <p:sldId id="312" r:id="rId10"/>
     <p:sldId id="314" r:id="rId11"/>
+    <p:sldId id="315" r:id="rId12"/>
+    <p:sldId id="316" r:id="rId13"/>
+    <p:sldId id="317" r:id="rId14"/>
   </p:sldIdLst>
   <p:sldSz cx="9144000" cy="6858000" type="screen4x3"/>
   <p:notesSz cx="6858000" cy="9144000"/>
@@ -125,13 +128,20 @@
             <p14:sldId id="256"/>
           </p14:sldIdLst>
         </p14:section>
-        <p14:section name="Sync Position/Size" id="{A3A2B0AB-762C-4281-AA7B-EF7E134E0DC4}">
+        <p14:section name="Sync Alignment" id="{A3A2B0AB-762C-4281-AA7B-EF7E134E0DC4}">
           <p14:sldIdLst>
             <p14:sldId id="311"/>
             <p14:sldId id="294"/>
             <p14:sldId id="313"/>
             <p14:sldId id="312"/>
             <p14:sldId id="314"/>
+          </p14:sldIdLst>
+        </p14:section>
+        <p14:section name="Sync Orientation" id="{A7477C09-32CE-4A28-8534-0125E315703C}">
+          <p14:sldIdLst>
+            <p14:sldId id="315"/>
+            <p14:sldId id="316"/>
+            <p14:sldId id="317"/>
           </p14:sldIdLst>
         </p14:section>
       </p14:sectionLst>
@@ -831,6 +841,180 @@
     <p:extLst>
       <p:ext uri="{BB962C8B-B14F-4D97-AF65-F5344CB8AC3E}">
         <p14:creationId xmlns:p14="http://schemas.microsoft.com/office/powerpoint/2010/main" val="3284066831"/>
+      </p:ext>
+    </p:extLst>
+  </p:cSld>
+  <p:clrMapOvr>
+    <a:masterClrMapping/>
+  </p:clrMapOvr>
+</p:notes>
+</file>
+
+<file path=ppt/notesSlides/notesSlide5.xml><?xml version="1.0" encoding="utf-8"?>
+<p:notes xmlns:a="http://schemas.openxmlformats.org/drawingml/2006/main" xmlns:r="http://schemas.openxmlformats.org/officeDocument/2006/relationships" xmlns:p="http://schemas.openxmlformats.org/presentationml/2006/main">
+  <p:cSld>
+    <p:spTree>
+      <p:nvGrpSpPr>
+        <p:cNvPr id="1" name=""/>
+        <p:cNvGrpSpPr/>
+        <p:nvPr/>
+      </p:nvGrpSpPr>
+      <p:grpSpPr>
+        <a:xfrm>
+          <a:off x="0" y="0"/>
+          <a:ext cx="0" cy="0"/>
+          <a:chOff x="0" y="0"/>
+          <a:chExt cx="0" cy="0"/>
+        </a:xfrm>
+      </p:grpSpPr>
+      <p:sp>
+        <p:nvSpPr>
+          <p:cNvPr id="2" name="Slide Image Placeholder 1"/>
+          <p:cNvSpPr>
+            <a:spLocks noGrp="1" noRot="1" noChangeAspect="1"/>
+          </p:cNvSpPr>
+          <p:nvPr>
+            <p:ph type="sldImg"/>
+          </p:nvPr>
+        </p:nvSpPr>
+        <p:spPr/>
+      </p:sp>
+      <p:sp>
+        <p:nvSpPr>
+          <p:cNvPr id="3" name="Notes Placeholder 2"/>
+          <p:cNvSpPr>
+            <a:spLocks noGrp="1"/>
+          </p:cNvSpPr>
+          <p:nvPr>
+            <p:ph type="body" idx="1"/>
+          </p:nvPr>
+        </p:nvSpPr>
+        <p:spPr/>
+        <p:txBody>
+          <a:bodyPr/>
+          <a:lstStyle/>
+          <a:p>
+            <a:r>
+              <a:rPr lang="en-US" dirty="0"/>
+              <a:t>Original Shapes</a:t>
+            </a:r>
+          </a:p>
+        </p:txBody>
+      </p:sp>
+      <p:sp>
+        <p:nvSpPr>
+          <p:cNvPr id="4" name="Slide Number Placeholder 3"/>
+          <p:cNvSpPr>
+            <a:spLocks noGrp="1"/>
+          </p:cNvSpPr>
+          <p:nvPr>
+            <p:ph type="sldNum" sz="quarter" idx="10"/>
+          </p:nvPr>
+        </p:nvSpPr>
+        <p:spPr/>
+        <p:txBody>
+          <a:bodyPr/>
+          <a:lstStyle/>
+          <a:p>
+            <a:fld id="{0FE7C38A-472B-4221-8E00-509E1DA863EC}" type="slidenum">
+              <a:rPr lang="en-US" smtClean="0"/>
+              <a:t>9</a:t>
+            </a:fld>
+            <a:endParaRPr lang="en-US"/>
+          </a:p>
+        </p:txBody>
+      </p:sp>
+    </p:spTree>
+    <p:extLst>
+      <p:ext uri="{BB962C8B-B14F-4D97-AF65-F5344CB8AC3E}">
+        <p14:creationId xmlns:p14="http://schemas.microsoft.com/office/powerpoint/2010/main" val="3724537719"/>
+      </p:ext>
+    </p:extLst>
+  </p:cSld>
+  <p:clrMapOvr>
+    <a:masterClrMapping/>
+  </p:clrMapOvr>
+</p:notes>
+</file>
+
+<file path=ppt/notesSlides/notesSlide6.xml><?xml version="1.0" encoding="utf-8"?>
+<p:notes xmlns:a="http://schemas.openxmlformats.org/drawingml/2006/main" xmlns:r="http://schemas.openxmlformats.org/officeDocument/2006/relationships" xmlns:p="http://schemas.openxmlformats.org/presentationml/2006/main">
+  <p:cSld>
+    <p:spTree>
+      <p:nvGrpSpPr>
+        <p:cNvPr id="1" name=""/>
+        <p:cNvGrpSpPr/>
+        <p:nvPr/>
+      </p:nvGrpSpPr>
+      <p:grpSpPr>
+        <a:xfrm>
+          <a:off x="0" y="0"/>
+          <a:ext cx="0" cy="0"/>
+          <a:chOff x="0" y="0"/>
+          <a:chExt cx="0" cy="0"/>
+        </a:xfrm>
+      </p:grpSpPr>
+      <p:sp>
+        <p:nvSpPr>
+          <p:cNvPr id="2" name="Slide Image Placeholder 1"/>
+          <p:cNvSpPr>
+            <a:spLocks noGrp="1" noRot="1" noChangeAspect="1"/>
+          </p:cNvSpPr>
+          <p:nvPr>
+            <p:ph type="sldImg"/>
+          </p:nvPr>
+        </p:nvSpPr>
+        <p:spPr/>
+      </p:sp>
+      <p:sp>
+        <p:nvSpPr>
+          <p:cNvPr id="3" name="Notes Placeholder 2"/>
+          <p:cNvSpPr>
+            <a:spLocks noGrp="1"/>
+          </p:cNvSpPr>
+          <p:nvPr>
+            <p:ph type="body" idx="1"/>
+          </p:nvPr>
+        </p:nvSpPr>
+        <p:spPr/>
+        <p:txBody>
+          <a:bodyPr/>
+          <a:lstStyle/>
+          <a:p>
+            <a:r>
+              <a:rPr lang="en-US" dirty="0"/>
+              <a:t>Original Shapes</a:t>
+            </a:r>
+          </a:p>
+        </p:txBody>
+      </p:sp>
+      <p:sp>
+        <p:nvSpPr>
+          <p:cNvPr id="4" name="Slide Number Placeholder 3"/>
+          <p:cNvSpPr>
+            <a:spLocks noGrp="1"/>
+          </p:cNvSpPr>
+          <p:nvPr>
+            <p:ph type="sldNum" sz="quarter" idx="10"/>
+          </p:nvPr>
+        </p:nvSpPr>
+        <p:spPr/>
+        <p:txBody>
+          <a:bodyPr/>
+          <a:lstStyle/>
+          <a:p>
+            <a:fld id="{0FE7C38A-472B-4221-8E00-509E1DA863EC}" type="slidenum">
+              <a:rPr lang="en-US" smtClean="0"/>
+              <a:t>10</a:t>
+            </a:fld>
+            <a:endParaRPr lang="en-US"/>
+          </a:p>
+        </p:txBody>
+      </p:sp>
+    </p:spTree>
+    <p:extLst>
+      <p:ext uri="{BB962C8B-B14F-4D97-AF65-F5344CB8AC3E}">
+        <p14:creationId xmlns:p14="http://schemas.microsoft.com/office/powerpoint/2010/main" val="786719525"/>
       </p:ext>
     </p:extLst>
   </p:cSld>
@@ -12895,6 +13079,386 @@
 </p:sld>
 </file>
 
+<file path=ppt/slides/slide10.xml><?xml version="1.0" encoding="utf-8"?>
+<p:sld xmlns:a="http://schemas.openxmlformats.org/drawingml/2006/main" xmlns:r="http://schemas.openxmlformats.org/officeDocument/2006/relationships" xmlns:p="http://schemas.openxmlformats.org/presentationml/2006/main">
+  <p:cSld>
+    <p:spTree>
+      <p:nvGrpSpPr>
+        <p:cNvPr id="1" name=""/>
+        <p:cNvGrpSpPr/>
+        <p:nvPr/>
+      </p:nvGrpSpPr>
+      <p:grpSpPr>
+        <a:xfrm>
+          <a:off x="0" y="0"/>
+          <a:ext cx="0" cy="0"/>
+          <a:chOff x="0" y="0"/>
+          <a:chExt cx="0" cy="0"/>
+        </a:xfrm>
+      </p:grpSpPr>
+      <p:sp>
+        <p:nvSpPr>
+          <p:cNvPr id="3" name="Horizontal source">
+            <a:extLst>
+              <a:ext uri="{FF2B5EF4-FFF2-40B4-BE49-F238E27FC236}">
+                <a16:creationId xmlns:a16="http://schemas.microsoft.com/office/drawing/2014/main" id="{1A17F2E3-B345-4AC9-A9F7-D0DF2AB2656A}"/>
+              </a:ext>
+            </a:extLst>
+          </p:cNvPr>
+          <p:cNvSpPr txBox="1"/>
+          <p:nvPr/>
+        </p:nvSpPr>
+        <p:spPr>
+          <a:xfrm>
+            <a:off x="1066800" y="990600"/>
+            <a:ext cx="1828800" cy="369332"/>
+          </a:xfrm>
+          <a:prstGeom prst="rect">
+            <a:avLst/>
+          </a:prstGeom>
+          <a:noFill/>
+        </p:spPr>
+        <p:txBody>
+          <a:bodyPr wrap="square" rtlCol="0">
+            <a:spAutoFit/>
+          </a:bodyPr>
+          <a:lstStyle/>
+          <a:p>
+            <a:r>
+              <a:rPr lang="en-US" dirty="0"/>
+              <a:t>Horizontal</a:t>
+            </a:r>
+          </a:p>
+        </p:txBody>
+      </p:sp>
+      <p:sp>
+        <p:nvSpPr>
+          <p:cNvPr id="8" name="Vertical source">
+            <a:extLst>
+              <a:ext uri="{FF2B5EF4-FFF2-40B4-BE49-F238E27FC236}">
+                <a16:creationId xmlns:a16="http://schemas.microsoft.com/office/drawing/2014/main" id="{2C5F2501-94CB-40B8-B613-490A084A6E56}"/>
+              </a:ext>
+            </a:extLst>
+          </p:cNvPr>
+          <p:cNvSpPr txBox="1"/>
+          <p:nvPr/>
+        </p:nvSpPr>
+        <p:spPr>
+          <a:xfrm>
+            <a:off x="1879937" y="2209800"/>
+            <a:ext cx="1015663" cy="369332"/>
+          </a:xfrm>
+          <a:prstGeom prst="rect">
+            <a:avLst/>
+          </a:prstGeom>
+          <a:noFill/>
+        </p:spPr>
+        <p:txBody>
+          <a:bodyPr vert="eaVert" wrap="square" rtlCol="0">
+            <a:spAutoFit/>
+          </a:bodyPr>
+          <a:lstStyle/>
+          <a:p>
+            <a:r>
+              <a:rPr lang="en-US" dirty="0"/>
+              <a:t>Vertical</a:t>
+            </a:r>
+          </a:p>
+        </p:txBody>
+      </p:sp>
+      <p:sp>
+        <p:nvSpPr>
+          <p:cNvPr id="9" name="Rotate90 source">
+            <a:extLst>
+              <a:ext uri="{FF2B5EF4-FFF2-40B4-BE49-F238E27FC236}">
+                <a16:creationId xmlns:a16="http://schemas.microsoft.com/office/drawing/2014/main" id="{7A5854C3-8AB2-41F5-AA1B-FB533D0EE730}"/>
+              </a:ext>
+            </a:extLst>
+          </p:cNvPr>
+          <p:cNvSpPr txBox="1"/>
+          <p:nvPr/>
+        </p:nvSpPr>
+        <p:spPr>
+          <a:xfrm>
+            <a:off x="1602938" y="3429000"/>
+            <a:ext cx="1292662" cy="369332"/>
+          </a:xfrm>
+          <a:prstGeom prst="rect">
+            <a:avLst/>
+          </a:prstGeom>
+          <a:noFill/>
+        </p:spPr>
+        <p:txBody>
+          <a:bodyPr vert="vert" wrap="square" rtlCol="0">
+            <a:spAutoFit/>
+          </a:bodyPr>
+          <a:lstStyle/>
+          <a:p>
+            <a:r>
+              <a:rPr lang="en-US" dirty="0"/>
+              <a:t>Rotate90</a:t>
+            </a:r>
+          </a:p>
+        </p:txBody>
+      </p:sp>
+      <p:sp>
+        <p:nvSpPr>
+          <p:cNvPr id="10" name="Rotate270 source">
+            <a:extLst>
+              <a:ext uri="{FF2B5EF4-FFF2-40B4-BE49-F238E27FC236}">
+                <a16:creationId xmlns:a16="http://schemas.microsoft.com/office/drawing/2014/main" id="{C258C011-B9B9-430F-842E-E6EDDCCAF93B}"/>
+              </a:ext>
+            </a:extLst>
+          </p:cNvPr>
+          <p:cNvSpPr txBox="1"/>
+          <p:nvPr/>
+        </p:nvSpPr>
+        <p:spPr>
+          <a:xfrm>
+            <a:off x="1066800" y="4648200"/>
+            <a:ext cx="1292662" cy="369332"/>
+          </a:xfrm>
+          <a:prstGeom prst="rect">
+            <a:avLst/>
+          </a:prstGeom>
+          <a:noFill/>
+        </p:spPr>
+        <p:txBody>
+          <a:bodyPr vert="vert270" wrap="square" rtlCol="0">
+            <a:spAutoFit/>
+          </a:bodyPr>
+          <a:lstStyle/>
+          <a:p>
+            <a:r>
+              <a:rPr lang="en-US" dirty="0"/>
+              <a:t>Rotate270</a:t>
+            </a:r>
+          </a:p>
+        </p:txBody>
+      </p:sp>
+      <p:sp>
+        <p:nvSpPr>
+          <p:cNvPr id="11" name="Horizontal target">
+            <a:extLst>
+              <a:ext uri="{FF2B5EF4-FFF2-40B4-BE49-F238E27FC236}">
+                <a16:creationId xmlns:a16="http://schemas.microsoft.com/office/drawing/2014/main" id="{D8949655-9B3E-4FCA-947F-2A70F9AE41AA}"/>
+              </a:ext>
+            </a:extLst>
+          </p:cNvPr>
+          <p:cNvSpPr txBox="1"/>
+          <p:nvPr/>
+        </p:nvSpPr>
+        <p:spPr>
+          <a:xfrm>
+            <a:off x="6403538" y="990600"/>
+            <a:ext cx="1292662" cy="369332"/>
+          </a:xfrm>
+          <a:prstGeom prst="rect">
+            <a:avLst/>
+          </a:prstGeom>
+          <a:noFill/>
+        </p:spPr>
+        <p:txBody>
+          <a:bodyPr vert="horz" wrap="square" rtlCol="0">
+            <a:spAutoFit/>
+          </a:bodyPr>
+          <a:lstStyle/>
+          <a:p>
+            <a:r>
+              <a:rPr lang="en-US" b="1" dirty="0"/>
+              <a:t>Horizontal</a:t>
+            </a:r>
+          </a:p>
+        </p:txBody>
+      </p:sp>
+      <p:sp>
+        <p:nvSpPr>
+          <p:cNvPr id="12" name="Vertical target">
+            <a:extLst>
+              <a:ext uri="{FF2B5EF4-FFF2-40B4-BE49-F238E27FC236}">
+                <a16:creationId xmlns:a16="http://schemas.microsoft.com/office/drawing/2014/main" id="{BB7371B5-9FD6-4124-84D9-AD9E6AEC7EB6}"/>
+              </a:ext>
+            </a:extLst>
+          </p:cNvPr>
+          <p:cNvSpPr txBox="1"/>
+          <p:nvPr/>
+        </p:nvSpPr>
+        <p:spPr>
+          <a:xfrm>
+            <a:off x="7666354" y="2209800"/>
+            <a:ext cx="1015663" cy="369332"/>
+          </a:xfrm>
+          <a:prstGeom prst="rect">
+            <a:avLst/>
+          </a:prstGeom>
+          <a:noFill/>
+        </p:spPr>
+        <p:txBody>
+          <a:bodyPr vert="eaVert" wrap="square" rtlCol="0">
+            <a:spAutoFit/>
+          </a:bodyPr>
+          <a:lstStyle/>
+          <a:p>
+            <a:r>
+              <a:rPr lang="en-US" b="1" dirty="0"/>
+              <a:t>Vertical</a:t>
+            </a:r>
+          </a:p>
+        </p:txBody>
+      </p:sp>
+      <p:sp>
+        <p:nvSpPr>
+          <p:cNvPr id="13" name="Rotate90 target">
+            <a:extLst>
+              <a:ext uri="{FF2B5EF4-FFF2-40B4-BE49-F238E27FC236}">
+                <a16:creationId xmlns:a16="http://schemas.microsoft.com/office/drawing/2014/main" id="{0A371897-5C3C-453A-81E9-DF58C0EE8364}"/>
+              </a:ext>
+            </a:extLst>
+          </p:cNvPr>
+          <p:cNvSpPr txBox="1"/>
+          <p:nvPr/>
+        </p:nvSpPr>
+        <p:spPr>
+          <a:xfrm>
+            <a:off x="6403538" y="3429000"/>
+            <a:ext cx="1292662" cy="369332"/>
+          </a:xfrm>
+          <a:prstGeom prst="rect">
+            <a:avLst/>
+          </a:prstGeom>
+          <a:noFill/>
+        </p:spPr>
+        <p:txBody>
+          <a:bodyPr vert="vert" wrap="square" rtlCol="0">
+            <a:spAutoFit/>
+          </a:bodyPr>
+          <a:lstStyle/>
+          <a:p>
+            <a:r>
+              <a:rPr lang="en-US" b="1" dirty="0"/>
+              <a:t>Rotate90</a:t>
+            </a:r>
+          </a:p>
+        </p:txBody>
+      </p:sp>
+      <p:sp>
+        <p:nvSpPr>
+          <p:cNvPr id="14" name="Rotate270 target">
+            <a:extLst>
+              <a:ext uri="{FF2B5EF4-FFF2-40B4-BE49-F238E27FC236}">
+                <a16:creationId xmlns:a16="http://schemas.microsoft.com/office/drawing/2014/main" id="{5AC33D6C-4CC2-470D-8F70-0ECF7236B11E}"/>
+              </a:ext>
+            </a:extLst>
+          </p:cNvPr>
+          <p:cNvSpPr txBox="1"/>
+          <p:nvPr/>
+        </p:nvSpPr>
+        <p:spPr>
+          <a:xfrm>
+            <a:off x="6403538" y="4648200"/>
+            <a:ext cx="1292662" cy="369332"/>
+          </a:xfrm>
+          <a:prstGeom prst="rect">
+            <a:avLst/>
+          </a:prstGeom>
+          <a:noFill/>
+        </p:spPr>
+        <p:txBody>
+          <a:bodyPr vert="vert270" wrap="square" rtlCol="0">
+            <a:spAutoFit/>
+          </a:bodyPr>
+          <a:lstStyle/>
+          <a:p>
+            <a:r>
+              <a:rPr lang="en-US" b="1" dirty="0"/>
+              <a:t>Rotate270</a:t>
+            </a:r>
+          </a:p>
+        </p:txBody>
+      </p:sp>
+      <p:sp>
+        <p:nvSpPr>
+          <p:cNvPr id="15" name="Stacked source">
+            <a:extLst>
+              <a:ext uri="{FF2B5EF4-FFF2-40B4-BE49-F238E27FC236}">
+                <a16:creationId xmlns:a16="http://schemas.microsoft.com/office/drawing/2014/main" id="{228CAF45-DBC5-439D-8EDF-766D331C9DF4}"/>
+              </a:ext>
+            </a:extLst>
+          </p:cNvPr>
+          <p:cNvSpPr txBox="1"/>
+          <p:nvPr/>
+        </p:nvSpPr>
+        <p:spPr>
+          <a:xfrm>
+            <a:off x="1066800" y="5682734"/>
+            <a:ext cx="2485873" cy="369332"/>
+          </a:xfrm>
+          <a:prstGeom prst="rect">
+            <a:avLst/>
+          </a:prstGeom>
+          <a:noFill/>
+        </p:spPr>
+        <p:txBody>
+          <a:bodyPr vert="wordArtVert" wrap="square" rtlCol="0">
+            <a:spAutoFit/>
+          </a:bodyPr>
+          <a:lstStyle/>
+          <a:p>
+            <a:r>
+              <a:rPr lang="en-US" dirty="0"/>
+              <a:t>Stacked</a:t>
+            </a:r>
+          </a:p>
+        </p:txBody>
+      </p:sp>
+      <p:sp>
+        <p:nvSpPr>
+          <p:cNvPr id="16" name="Stacked target">
+            <a:extLst>
+              <a:ext uri="{FF2B5EF4-FFF2-40B4-BE49-F238E27FC236}">
+                <a16:creationId xmlns:a16="http://schemas.microsoft.com/office/drawing/2014/main" id="{0E2FB94F-101A-45DA-B669-5D29426119D1}"/>
+              </a:ext>
+            </a:extLst>
+          </p:cNvPr>
+          <p:cNvSpPr txBox="1"/>
+          <p:nvPr/>
+        </p:nvSpPr>
+        <p:spPr>
+          <a:xfrm>
+            <a:off x="5867400" y="5682734"/>
+            <a:ext cx="2485873" cy="369332"/>
+          </a:xfrm>
+          <a:prstGeom prst="rect">
+            <a:avLst/>
+          </a:prstGeom>
+          <a:noFill/>
+        </p:spPr>
+        <p:txBody>
+          <a:bodyPr vert="wordArtVert" wrap="square" rtlCol="0">
+            <a:spAutoFit/>
+          </a:bodyPr>
+          <a:lstStyle/>
+          <a:p>
+            <a:r>
+              <a:rPr lang="en-US" b="1" dirty="0"/>
+              <a:t>Stacked</a:t>
+            </a:r>
+          </a:p>
+        </p:txBody>
+      </p:sp>
+    </p:spTree>
+    <p:extLst>
+      <p:ext uri="{BB962C8B-B14F-4D97-AF65-F5344CB8AC3E}">
+        <p14:creationId xmlns:p14="http://schemas.microsoft.com/office/powerpoint/2010/main" val="1754416839"/>
+      </p:ext>
+    </p:extLst>
+  </p:cSld>
+  <p:clrMapOvr>
+    <a:masterClrMapping/>
+  </p:clrMapOvr>
+</p:sld>
+</file>
+
 <file path=ppt/slides/slide2.xml><?xml version="1.0" encoding="utf-8"?>
 <p:sld xmlns:a="http://schemas.openxmlformats.org/drawingml/2006/main" xmlns:r="http://schemas.openxmlformats.org/officeDocument/2006/relationships" xmlns:p="http://schemas.openxmlformats.org/presentationml/2006/main">
   <p:cSld>
@@ -13048,7 +13612,7 @@
           <a:p>
             <a:r>
               <a:rPr lang="en-US" dirty="0"/>
-              <a:t>Vertical alignment slide: 5</a:t>
+              <a:t>Vertical alignment slide: 6</a:t>
             </a:r>
           </a:p>
         </p:txBody>
@@ -15581,6 +16145,476 @@
     <p:extLst>
       <p:ext uri="{BB962C8B-B14F-4D97-AF65-F5344CB8AC3E}">
         <p14:creationId xmlns:p14="http://schemas.microsoft.com/office/powerpoint/2010/main" val="4242314986"/>
+      </p:ext>
+    </p:extLst>
+  </p:cSld>
+  <p:clrMapOvr>
+    <a:masterClrMapping/>
+  </p:clrMapOvr>
+</p:sld>
+</file>
+
+<file path=ppt/slides/slide8.xml><?xml version="1.0" encoding="utf-8"?>
+<p:sld xmlns:a="http://schemas.openxmlformats.org/drawingml/2006/main" xmlns:r="http://schemas.openxmlformats.org/officeDocument/2006/relationships" xmlns:p="http://schemas.openxmlformats.org/presentationml/2006/main">
+  <p:cSld>
+    <p:spTree>
+      <p:nvGrpSpPr>
+        <p:cNvPr id="1" name=""/>
+        <p:cNvGrpSpPr/>
+        <p:nvPr/>
+      </p:nvGrpSpPr>
+      <p:grpSpPr>
+        <a:xfrm>
+          <a:off x="0" y="0"/>
+          <a:ext cx="0" cy="0"/>
+          <a:chOff x="0" y="0"/>
+          <a:chExt cx="0" cy="0"/>
+        </a:xfrm>
+      </p:grpSpPr>
+      <p:sp>
+        <p:nvSpPr>
+          <p:cNvPr id="2" name="Title 1"/>
+          <p:cNvSpPr>
+            <a:spLocks noGrp="1"/>
+          </p:cNvSpPr>
+          <p:nvPr>
+            <p:ph type="title"/>
+          </p:nvPr>
+        </p:nvSpPr>
+        <p:spPr/>
+        <p:txBody>
+          <a:bodyPr/>
+          <a:lstStyle/>
+          <a:p>
+            <a:r>
+              <a:rPr lang="en-US" dirty="0"/>
+              <a:t>Sync:: Text Orientation </a:t>
+            </a:r>
+            <a:endParaRPr lang="en-SG" dirty="0"/>
+          </a:p>
+        </p:txBody>
+      </p:sp>
+      <p:sp>
+        <p:nvSpPr>
+          <p:cNvPr id="4" name="Content Placeholder 3"/>
+          <p:cNvSpPr>
+            <a:spLocks noGrp="1"/>
+          </p:cNvSpPr>
+          <p:nvPr>
+            <p:ph idx="1"/>
+          </p:nvPr>
+        </p:nvSpPr>
+        <p:spPr/>
+        <p:txBody>
+          <a:bodyPr/>
+          <a:lstStyle/>
+          <a:p>
+            <a:pPr marL="0" indent="0">
+              <a:buNone/>
+            </a:pPr>
+            <a:r>
+              <a:rPr lang="en-US" b="1" dirty="0"/>
+              <a:t>Additional instructions:</a:t>
+            </a:r>
+          </a:p>
+          <a:p>
+            <a:r>
+              <a:rPr lang="en-US" dirty="0"/>
+              <a:t>Sync item from left to right</a:t>
+            </a:r>
+          </a:p>
+          <a:p>
+            <a:r>
+              <a:rPr lang="en-US" dirty="0"/>
+              <a:t>Orientation: 9</a:t>
+            </a:r>
+          </a:p>
+        </p:txBody>
+      </p:sp>
+    </p:spTree>
+    <p:extLst>
+      <p:ext uri="{BB962C8B-B14F-4D97-AF65-F5344CB8AC3E}">
+        <p14:creationId xmlns:p14="http://schemas.microsoft.com/office/powerpoint/2010/main" val="4126751534"/>
+      </p:ext>
+    </p:extLst>
+  </p:cSld>
+  <p:clrMapOvr>
+    <a:masterClrMapping/>
+  </p:clrMapOvr>
+</p:sld>
+</file>
+
+<file path=ppt/slides/slide9.xml><?xml version="1.0" encoding="utf-8"?>
+<p:sld xmlns:a="http://schemas.openxmlformats.org/drawingml/2006/main" xmlns:r="http://schemas.openxmlformats.org/officeDocument/2006/relationships" xmlns:p="http://schemas.openxmlformats.org/presentationml/2006/main">
+  <p:cSld>
+    <p:spTree>
+      <p:nvGrpSpPr>
+        <p:cNvPr id="1" name=""/>
+        <p:cNvGrpSpPr/>
+        <p:nvPr/>
+      </p:nvGrpSpPr>
+      <p:grpSpPr>
+        <a:xfrm>
+          <a:off x="0" y="0"/>
+          <a:ext cx="0" cy="0"/>
+          <a:chOff x="0" y="0"/>
+          <a:chExt cx="0" cy="0"/>
+        </a:xfrm>
+      </p:grpSpPr>
+      <p:sp>
+        <p:nvSpPr>
+          <p:cNvPr id="3" name="Horizontal source">
+            <a:extLst>
+              <a:ext uri="{FF2B5EF4-FFF2-40B4-BE49-F238E27FC236}">
+                <a16:creationId xmlns:a16="http://schemas.microsoft.com/office/drawing/2014/main" id="{1A17F2E3-B345-4AC9-A9F7-D0DF2AB2656A}"/>
+              </a:ext>
+            </a:extLst>
+          </p:cNvPr>
+          <p:cNvSpPr txBox="1"/>
+          <p:nvPr/>
+        </p:nvSpPr>
+        <p:spPr>
+          <a:xfrm>
+            <a:off x="1066800" y="990600"/>
+            <a:ext cx="1828800" cy="369332"/>
+          </a:xfrm>
+          <a:prstGeom prst="rect">
+            <a:avLst/>
+          </a:prstGeom>
+          <a:noFill/>
+        </p:spPr>
+        <p:txBody>
+          <a:bodyPr wrap="square" rtlCol="0">
+            <a:spAutoFit/>
+          </a:bodyPr>
+          <a:lstStyle/>
+          <a:p>
+            <a:r>
+              <a:rPr lang="en-US" dirty="0"/>
+              <a:t>Horizontal</a:t>
+            </a:r>
+          </a:p>
+        </p:txBody>
+      </p:sp>
+      <p:sp>
+        <p:nvSpPr>
+          <p:cNvPr id="8" name="Vertical source">
+            <a:extLst>
+              <a:ext uri="{FF2B5EF4-FFF2-40B4-BE49-F238E27FC236}">
+                <a16:creationId xmlns:a16="http://schemas.microsoft.com/office/drawing/2014/main" id="{2C5F2501-94CB-40B8-B613-490A084A6E56}"/>
+              </a:ext>
+            </a:extLst>
+          </p:cNvPr>
+          <p:cNvSpPr txBox="1"/>
+          <p:nvPr/>
+        </p:nvSpPr>
+        <p:spPr>
+          <a:xfrm>
+            <a:off x="1879937" y="2209800"/>
+            <a:ext cx="1015663" cy="369332"/>
+          </a:xfrm>
+          <a:prstGeom prst="rect">
+            <a:avLst/>
+          </a:prstGeom>
+          <a:noFill/>
+        </p:spPr>
+        <p:txBody>
+          <a:bodyPr vert="eaVert" wrap="square" rtlCol="0">
+            <a:spAutoFit/>
+          </a:bodyPr>
+          <a:lstStyle/>
+          <a:p>
+            <a:r>
+              <a:rPr lang="en-US" dirty="0"/>
+              <a:t>Vertical</a:t>
+            </a:r>
+          </a:p>
+        </p:txBody>
+      </p:sp>
+      <p:sp>
+        <p:nvSpPr>
+          <p:cNvPr id="9" name="Rotate90 source">
+            <a:extLst>
+              <a:ext uri="{FF2B5EF4-FFF2-40B4-BE49-F238E27FC236}">
+                <a16:creationId xmlns:a16="http://schemas.microsoft.com/office/drawing/2014/main" id="{7A5854C3-8AB2-41F5-AA1B-FB533D0EE730}"/>
+              </a:ext>
+            </a:extLst>
+          </p:cNvPr>
+          <p:cNvSpPr txBox="1"/>
+          <p:nvPr/>
+        </p:nvSpPr>
+        <p:spPr>
+          <a:xfrm>
+            <a:off x="1602938" y="3429000"/>
+            <a:ext cx="1292662" cy="369332"/>
+          </a:xfrm>
+          <a:prstGeom prst="rect">
+            <a:avLst/>
+          </a:prstGeom>
+          <a:noFill/>
+        </p:spPr>
+        <p:txBody>
+          <a:bodyPr vert="vert" wrap="square" rtlCol="0">
+            <a:spAutoFit/>
+          </a:bodyPr>
+          <a:lstStyle/>
+          <a:p>
+            <a:r>
+              <a:rPr lang="en-US" dirty="0"/>
+              <a:t>Rotate90</a:t>
+            </a:r>
+          </a:p>
+        </p:txBody>
+      </p:sp>
+      <p:sp>
+        <p:nvSpPr>
+          <p:cNvPr id="10" name="Rotate270 source">
+            <a:extLst>
+              <a:ext uri="{FF2B5EF4-FFF2-40B4-BE49-F238E27FC236}">
+                <a16:creationId xmlns:a16="http://schemas.microsoft.com/office/drawing/2014/main" id="{C258C011-B9B9-430F-842E-E6EDDCCAF93B}"/>
+              </a:ext>
+            </a:extLst>
+          </p:cNvPr>
+          <p:cNvSpPr txBox="1"/>
+          <p:nvPr/>
+        </p:nvSpPr>
+        <p:spPr>
+          <a:xfrm>
+            <a:off x="1066800" y="4648200"/>
+            <a:ext cx="1292662" cy="369332"/>
+          </a:xfrm>
+          <a:prstGeom prst="rect">
+            <a:avLst/>
+          </a:prstGeom>
+          <a:noFill/>
+        </p:spPr>
+        <p:txBody>
+          <a:bodyPr vert="vert270" wrap="square" rtlCol="0">
+            <a:spAutoFit/>
+          </a:bodyPr>
+          <a:lstStyle/>
+          <a:p>
+            <a:r>
+              <a:rPr lang="en-US" dirty="0"/>
+              <a:t>Rotate270</a:t>
+            </a:r>
+          </a:p>
+        </p:txBody>
+      </p:sp>
+      <p:sp>
+        <p:nvSpPr>
+          <p:cNvPr id="11" name="Horizontal target">
+            <a:extLst>
+              <a:ext uri="{FF2B5EF4-FFF2-40B4-BE49-F238E27FC236}">
+                <a16:creationId xmlns:a16="http://schemas.microsoft.com/office/drawing/2014/main" id="{D8949655-9B3E-4FCA-947F-2A70F9AE41AA}"/>
+              </a:ext>
+            </a:extLst>
+          </p:cNvPr>
+          <p:cNvSpPr txBox="1"/>
+          <p:nvPr/>
+        </p:nvSpPr>
+        <p:spPr>
+          <a:xfrm>
+            <a:off x="6403538" y="990600"/>
+            <a:ext cx="1292662" cy="369332"/>
+          </a:xfrm>
+          <a:prstGeom prst="rect">
+            <a:avLst/>
+          </a:prstGeom>
+          <a:noFill/>
+        </p:spPr>
+        <p:txBody>
+          <a:bodyPr vert="eaVert" wrap="square" rtlCol="0">
+            <a:spAutoFit/>
+          </a:bodyPr>
+          <a:lstStyle/>
+          <a:p>
+            <a:r>
+              <a:rPr lang="en-US" b="1" dirty="0"/>
+              <a:t>Horizontal</a:t>
+            </a:r>
+          </a:p>
+        </p:txBody>
+      </p:sp>
+      <p:sp>
+        <p:nvSpPr>
+          <p:cNvPr id="12" name="Vertical target">
+            <a:extLst>
+              <a:ext uri="{FF2B5EF4-FFF2-40B4-BE49-F238E27FC236}">
+                <a16:creationId xmlns:a16="http://schemas.microsoft.com/office/drawing/2014/main" id="{BB7371B5-9FD6-4124-84D9-AD9E6AEC7EB6}"/>
+              </a:ext>
+            </a:extLst>
+          </p:cNvPr>
+          <p:cNvSpPr txBox="1"/>
+          <p:nvPr/>
+        </p:nvSpPr>
+        <p:spPr>
+          <a:xfrm>
+            <a:off x="5867400" y="2209800"/>
+            <a:ext cx="2814617" cy="369332"/>
+          </a:xfrm>
+          <a:prstGeom prst="rect">
+            <a:avLst/>
+          </a:prstGeom>
+          <a:noFill/>
+        </p:spPr>
+        <p:txBody>
+          <a:bodyPr vert="wordArtVert" wrap="square" rtlCol="0">
+            <a:spAutoFit/>
+          </a:bodyPr>
+          <a:lstStyle/>
+          <a:p>
+            <a:r>
+              <a:rPr lang="en-US" b="1" dirty="0"/>
+              <a:t>Vertical</a:t>
+            </a:r>
+          </a:p>
+        </p:txBody>
+      </p:sp>
+      <p:sp>
+        <p:nvSpPr>
+          <p:cNvPr id="13" name="Rotate90 target">
+            <a:extLst>
+              <a:ext uri="{FF2B5EF4-FFF2-40B4-BE49-F238E27FC236}">
+                <a16:creationId xmlns:a16="http://schemas.microsoft.com/office/drawing/2014/main" id="{0A371897-5C3C-453A-81E9-DF58C0EE8364}"/>
+              </a:ext>
+            </a:extLst>
+          </p:cNvPr>
+          <p:cNvSpPr txBox="1"/>
+          <p:nvPr/>
+        </p:nvSpPr>
+        <p:spPr>
+          <a:xfrm>
+            <a:off x="6403538" y="3429000"/>
+            <a:ext cx="1292662" cy="369332"/>
+          </a:xfrm>
+          <a:prstGeom prst="rect">
+            <a:avLst/>
+          </a:prstGeom>
+          <a:noFill/>
+        </p:spPr>
+        <p:txBody>
+          <a:bodyPr vert="horz" wrap="square" rtlCol="0">
+            <a:spAutoFit/>
+          </a:bodyPr>
+          <a:lstStyle/>
+          <a:p>
+            <a:r>
+              <a:rPr lang="en-US" b="1" dirty="0"/>
+              <a:t>Rotate90</a:t>
+            </a:r>
+          </a:p>
+        </p:txBody>
+      </p:sp>
+      <p:sp>
+        <p:nvSpPr>
+          <p:cNvPr id="14" name="Rotate270 target">
+            <a:extLst>
+              <a:ext uri="{FF2B5EF4-FFF2-40B4-BE49-F238E27FC236}">
+                <a16:creationId xmlns:a16="http://schemas.microsoft.com/office/drawing/2014/main" id="{5AC33D6C-4CC2-470D-8F70-0ECF7236B11E}"/>
+              </a:ext>
+            </a:extLst>
+          </p:cNvPr>
+          <p:cNvSpPr txBox="1"/>
+          <p:nvPr/>
+        </p:nvSpPr>
+        <p:spPr>
+          <a:xfrm>
+            <a:off x="6403538" y="4648200"/>
+            <a:ext cx="1292662" cy="369332"/>
+          </a:xfrm>
+          <a:prstGeom prst="rect">
+            <a:avLst/>
+          </a:prstGeom>
+          <a:noFill/>
+        </p:spPr>
+        <p:txBody>
+          <a:bodyPr vert="vert" wrap="square" rtlCol="0">
+            <a:spAutoFit/>
+          </a:bodyPr>
+          <a:lstStyle/>
+          <a:p>
+            <a:r>
+              <a:rPr lang="en-US" b="1" dirty="0"/>
+              <a:t>Rotate270</a:t>
+            </a:r>
+          </a:p>
+        </p:txBody>
+      </p:sp>
+      <p:sp>
+        <p:nvSpPr>
+          <p:cNvPr id="15" name="Stacked source">
+            <a:extLst>
+              <a:ext uri="{FF2B5EF4-FFF2-40B4-BE49-F238E27FC236}">
+                <a16:creationId xmlns:a16="http://schemas.microsoft.com/office/drawing/2014/main" id="{228CAF45-DBC5-439D-8EDF-766D331C9DF4}"/>
+              </a:ext>
+            </a:extLst>
+          </p:cNvPr>
+          <p:cNvSpPr txBox="1"/>
+          <p:nvPr/>
+        </p:nvSpPr>
+        <p:spPr>
+          <a:xfrm>
+            <a:off x="1066800" y="5682734"/>
+            <a:ext cx="2485873" cy="369332"/>
+          </a:xfrm>
+          <a:prstGeom prst="rect">
+            <a:avLst/>
+          </a:prstGeom>
+          <a:noFill/>
+        </p:spPr>
+        <p:txBody>
+          <a:bodyPr vert="wordArtVert" wrap="square" rtlCol="0">
+            <a:spAutoFit/>
+          </a:bodyPr>
+          <a:lstStyle/>
+          <a:p>
+            <a:r>
+              <a:rPr lang="en-US" dirty="0"/>
+              <a:t>Stacked</a:t>
+            </a:r>
+          </a:p>
+        </p:txBody>
+      </p:sp>
+      <p:sp>
+        <p:nvSpPr>
+          <p:cNvPr id="16" name="Stacked target">
+            <a:extLst>
+              <a:ext uri="{FF2B5EF4-FFF2-40B4-BE49-F238E27FC236}">
+                <a16:creationId xmlns:a16="http://schemas.microsoft.com/office/drawing/2014/main" id="{0E2FB94F-101A-45DA-B669-5D29426119D1}"/>
+              </a:ext>
+            </a:extLst>
+          </p:cNvPr>
+          <p:cNvSpPr txBox="1"/>
+          <p:nvPr/>
+        </p:nvSpPr>
+        <p:spPr>
+          <a:xfrm>
+            <a:off x="5867400" y="5682734"/>
+            <a:ext cx="1292662" cy="369332"/>
+          </a:xfrm>
+          <a:prstGeom prst="rect">
+            <a:avLst/>
+          </a:prstGeom>
+          <a:noFill/>
+        </p:spPr>
+        <p:txBody>
+          <a:bodyPr vert="vert270" wrap="square" rtlCol="0">
+            <a:spAutoFit/>
+          </a:bodyPr>
+          <a:lstStyle/>
+          <a:p>
+            <a:r>
+              <a:rPr lang="en-US" b="1" dirty="0"/>
+              <a:t>Stacked</a:t>
+            </a:r>
+          </a:p>
+        </p:txBody>
+      </p:sp>
+    </p:spTree>
+    <p:extLst>
+      <p:ext uri="{BB962C8B-B14F-4D97-AF65-F5344CB8AC3E}">
+        <p14:creationId xmlns:p14="http://schemas.microsoft.com/office/powerpoint/2010/main" val="2730598192"/>
       </p:ext>
     </p:extLst>
   </p:cSld>

</xml_diff>

<commit_message>
Add test for sync line spacing.
</commit_message>
<xml_diff>
--- a/doc/test/SyncLab/SyncLab_Text.pptx
+++ b/doc/test/SyncLab/SyncLab_Text.pptx
@@ -8,7 +8,7 @@
     <p:sldMasterId id="2147483684" r:id="rId4"/>
   </p:sldMasterIdLst>
   <p:notesMasterIdLst>
-    <p:notesMasterId r:id="rId15"/>
+    <p:notesMasterId r:id="rId18"/>
   </p:notesMasterIdLst>
   <p:sldIdLst>
     <p:sldId id="287" r:id="rId5"/>
@@ -21,6 +21,9 @@
     <p:sldId id="315" r:id="rId12"/>
     <p:sldId id="316" r:id="rId13"/>
     <p:sldId id="317" r:id="rId14"/>
+    <p:sldId id="318" r:id="rId15"/>
+    <p:sldId id="319" r:id="rId16"/>
+    <p:sldId id="320" r:id="rId17"/>
   </p:sldIdLst>
   <p:sldSz cx="9144000" cy="6858000" type="screen4x3"/>
   <p:notesSz cx="6858000" cy="9144000"/>
@@ -144,6 +147,13 @@
             <p14:sldId id="317"/>
           </p14:sldIdLst>
         </p14:section>
+        <p14:section name="Sync Spacing" id="{00D76CB9-FB5D-40D0-82B6-E15C140FEABA}">
+          <p14:sldIdLst>
+            <p14:sldId id="318"/>
+            <p14:sldId id="319"/>
+            <p14:sldId id="320"/>
+          </p14:sldIdLst>
+        </p14:section>
       </p14:sectionLst>
     </p:ext>
     <p:ext uri="{EFAFB233-063F-42B5-8137-9DF3F51BA10A}">
@@ -1015,6 +1025,180 @@
     <p:extLst>
       <p:ext uri="{BB962C8B-B14F-4D97-AF65-F5344CB8AC3E}">
         <p14:creationId xmlns:p14="http://schemas.microsoft.com/office/powerpoint/2010/main" val="786719525"/>
+      </p:ext>
+    </p:extLst>
+  </p:cSld>
+  <p:clrMapOvr>
+    <a:masterClrMapping/>
+  </p:clrMapOvr>
+</p:notes>
+</file>
+
+<file path=ppt/notesSlides/notesSlide7.xml><?xml version="1.0" encoding="utf-8"?>
+<p:notes xmlns:a="http://schemas.openxmlformats.org/drawingml/2006/main" xmlns:r="http://schemas.openxmlformats.org/officeDocument/2006/relationships" xmlns:p="http://schemas.openxmlformats.org/presentationml/2006/main">
+  <p:cSld>
+    <p:spTree>
+      <p:nvGrpSpPr>
+        <p:cNvPr id="1" name=""/>
+        <p:cNvGrpSpPr/>
+        <p:nvPr/>
+      </p:nvGrpSpPr>
+      <p:grpSpPr>
+        <a:xfrm>
+          <a:off x="0" y="0"/>
+          <a:ext cx="0" cy="0"/>
+          <a:chOff x="0" y="0"/>
+          <a:chExt cx="0" cy="0"/>
+        </a:xfrm>
+      </p:grpSpPr>
+      <p:sp>
+        <p:nvSpPr>
+          <p:cNvPr id="2" name="Slide Image Placeholder 1"/>
+          <p:cNvSpPr>
+            <a:spLocks noGrp="1" noRot="1" noChangeAspect="1"/>
+          </p:cNvSpPr>
+          <p:nvPr>
+            <p:ph type="sldImg"/>
+          </p:nvPr>
+        </p:nvSpPr>
+        <p:spPr/>
+      </p:sp>
+      <p:sp>
+        <p:nvSpPr>
+          <p:cNvPr id="3" name="Notes Placeholder 2"/>
+          <p:cNvSpPr>
+            <a:spLocks noGrp="1"/>
+          </p:cNvSpPr>
+          <p:nvPr>
+            <p:ph type="body" idx="1"/>
+          </p:nvPr>
+        </p:nvSpPr>
+        <p:spPr/>
+        <p:txBody>
+          <a:bodyPr/>
+          <a:lstStyle/>
+          <a:p>
+            <a:r>
+              <a:rPr lang="en-US" dirty="0"/>
+              <a:t>Original Shapes</a:t>
+            </a:r>
+          </a:p>
+        </p:txBody>
+      </p:sp>
+      <p:sp>
+        <p:nvSpPr>
+          <p:cNvPr id="4" name="Slide Number Placeholder 3"/>
+          <p:cNvSpPr>
+            <a:spLocks noGrp="1"/>
+          </p:cNvSpPr>
+          <p:nvPr>
+            <p:ph type="sldNum" sz="quarter" idx="10"/>
+          </p:nvPr>
+        </p:nvSpPr>
+        <p:spPr/>
+        <p:txBody>
+          <a:bodyPr/>
+          <a:lstStyle/>
+          <a:p>
+            <a:fld id="{0FE7C38A-472B-4221-8E00-509E1DA863EC}" type="slidenum">
+              <a:rPr lang="en-US" smtClean="0"/>
+              <a:t>12</a:t>
+            </a:fld>
+            <a:endParaRPr lang="en-US"/>
+          </a:p>
+        </p:txBody>
+      </p:sp>
+    </p:spTree>
+    <p:extLst>
+      <p:ext uri="{BB962C8B-B14F-4D97-AF65-F5344CB8AC3E}">
+        <p14:creationId xmlns:p14="http://schemas.microsoft.com/office/powerpoint/2010/main" val="3741714008"/>
+      </p:ext>
+    </p:extLst>
+  </p:cSld>
+  <p:clrMapOvr>
+    <a:masterClrMapping/>
+  </p:clrMapOvr>
+</p:notes>
+</file>
+
+<file path=ppt/notesSlides/notesSlide8.xml><?xml version="1.0" encoding="utf-8"?>
+<p:notes xmlns:a="http://schemas.openxmlformats.org/drawingml/2006/main" xmlns:r="http://schemas.openxmlformats.org/officeDocument/2006/relationships" xmlns:p="http://schemas.openxmlformats.org/presentationml/2006/main">
+  <p:cSld>
+    <p:spTree>
+      <p:nvGrpSpPr>
+        <p:cNvPr id="1" name=""/>
+        <p:cNvGrpSpPr/>
+        <p:nvPr/>
+      </p:nvGrpSpPr>
+      <p:grpSpPr>
+        <a:xfrm>
+          <a:off x="0" y="0"/>
+          <a:ext cx="0" cy="0"/>
+          <a:chOff x="0" y="0"/>
+          <a:chExt cx="0" cy="0"/>
+        </a:xfrm>
+      </p:grpSpPr>
+      <p:sp>
+        <p:nvSpPr>
+          <p:cNvPr id="2" name="Slide Image Placeholder 1"/>
+          <p:cNvSpPr>
+            <a:spLocks noGrp="1" noRot="1" noChangeAspect="1"/>
+          </p:cNvSpPr>
+          <p:nvPr>
+            <p:ph type="sldImg"/>
+          </p:nvPr>
+        </p:nvSpPr>
+        <p:spPr/>
+      </p:sp>
+      <p:sp>
+        <p:nvSpPr>
+          <p:cNvPr id="3" name="Notes Placeholder 2"/>
+          <p:cNvSpPr>
+            <a:spLocks noGrp="1"/>
+          </p:cNvSpPr>
+          <p:nvPr>
+            <p:ph type="body" idx="1"/>
+          </p:nvPr>
+        </p:nvSpPr>
+        <p:spPr/>
+        <p:txBody>
+          <a:bodyPr/>
+          <a:lstStyle/>
+          <a:p>
+            <a:r>
+              <a:rPr lang="en-US" dirty="0"/>
+              <a:t>Original Shapes</a:t>
+            </a:r>
+          </a:p>
+        </p:txBody>
+      </p:sp>
+      <p:sp>
+        <p:nvSpPr>
+          <p:cNvPr id="4" name="Slide Number Placeholder 3"/>
+          <p:cNvSpPr>
+            <a:spLocks noGrp="1"/>
+          </p:cNvSpPr>
+          <p:nvPr>
+            <p:ph type="sldNum" sz="quarter" idx="10"/>
+          </p:nvPr>
+        </p:nvSpPr>
+        <p:spPr/>
+        <p:txBody>
+          <a:bodyPr/>
+          <a:lstStyle/>
+          <a:p>
+            <a:fld id="{0FE7C38A-472B-4221-8E00-509E1DA863EC}" type="slidenum">
+              <a:rPr lang="en-US" smtClean="0"/>
+              <a:t>13</a:t>
+            </a:fld>
+            <a:endParaRPr lang="en-US"/>
+          </a:p>
+        </p:txBody>
+      </p:sp>
+    </p:spTree>
+    <p:extLst>
+      <p:ext uri="{BB962C8B-B14F-4D97-AF65-F5344CB8AC3E}">
+        <p14:creationId xmlns:p14="http://schemas.microsoft.com/office/powerpoint/2010/main" val="1915118386"/>
       </p:ext>
     </p:extLst>
   </p:cSld>
@@ -13450,6 +13634,936 @@
     <p:extLst>
       <p:ext uri="{BB962C8B-B14F-4D97-AF65-F5344CB8AC3E}">
         <p14:creationId xmlns:p14="http://schemas.microsoft.com/office/powerpoint/2010/main" val="1754416839"/>
+      </p:ext>
+    </p:extLst>
+  </p:cSld>
+  <p:clrMapOvr>
+    <a:masterClrMapping/>
+  </p:clrMapOvr>
+</p:sld>
+</file>
+
+<file path=ppt/slides/slide11.xml><?xml version="1.0" encoding="utf-8"?>
+<p:sld xmlns:a="http://schemas.openxmlformats.org/drawingml/2006/main" xmlns:r="http://schemas.openxmlformats.org/officeDocument/2006/relationships" xmlns:p="http://schemas.openxmlformats.org/presentationml/2006/main">
+  <p:cSld>
+    <p:spTree>
+      <p:nvGrpSpPr>
+        <p:cNvPr id="1" name=""/>
+        <p:cNvGrpSpPr/>
+        <p:nvPr/>
+      </p:nvGrpSpPr>
+      <p:grpSpPr>
+        <a:xfrm>
+          <a:off x="0" y="0"/>
+          <a:ext cx="0" cy="0"/>
+          <a:chOff x="0" y="0"/>
+          <a:chExt cx="0" cy="0"/>
+        </a:xfrm>
+      </p:grpSpPr>
+      <p:sp>
+        <p:nvSpPr>
+          <p:cNvPr id="2" name="Title 1"/>
+          <p:cNvSpPr>
+            <a:spLocks noGrp="1"/>
+          </p:cNvSpPr>
+          <p:nvPr>
+            <p:ph type="title"/>
+          </p:nvPr>
+        </p:nvSpPr>
+        <p:spPr/>
+        <p:txBody>
+          <a:bodyPr/>
+          <a:lstStyle/>
+          <a:p>
+            <a:r>
+              <a:rPr lang="en-US" dirty="0"/>
+              <a:t>Sync:: Text Line Spacing </a:t>
+            </a:r>
+            <a:endParaRPr lang="en-SG" dirty="0"/>
+          </a:p>
+        </p:txBody>
+      </p:sp>
+      <p:sp>
+        <p:nvSpPr>
+          <p:cNvPr id="4" name="Content Placeholder 3"/>
+          <p:cNvSpPr>
+            <a:spLocks noGrp="1"/>
+          </p:cNvSpPr>
+          <p:nvPr>
+            <p:ph idx="1"/>
+          </p:nvPr>
+        </p:nvSpPr>
+        <p:spPr/>
+        <p:txBody>
+          <a:bodyPr/>
+          <a:lstStyle/>
+          <a:p>
+            <a:pPr marL="0" indent="0">
+              <a:buNone/>
+            </a:pPr>
+            <a:r>
+              <a:rPr lang="en-US" b="1" dirty="0"/>
+              <a:t>Additional instructions:</a:t>
+            </a:r>
+          </a:p>
+          <a:p>
+            <a:r>
+              <a:rPr lang="en-US" dirty="0"/>
+              <a:t>Sync item from left to right</a:t>
+            </a:r>
+          </a:p>
+          <a:p>
+            <a:r>
+              <a:rPr lang="en-US" dirty="0"/>
+              <a:t>Spacing: 12</a:t>
+            </a:r>
+          </a:p>
+        </p:txBody>
+      </p:sp>
+    </p:spTree>
+    <p:extLst>
+      <p:ext uri="{BB962C8B-B14F-4D97-AF65-F5344CB8AC3E}">
+        <p14:creationId xmlns:p14="http://schemas.microsoft.com/office/powerpoint/2010/main" val="2054338543"/>
+      </p:ext>
+    </p:extLst>
+  </p:cSld>
+  <p:clrMapOvr>
+    <a:masterClrMapping/>
+  </p:clrMapOvr>
+</p:sld>
+</file>
+
+<file path=ppt/slides/slide12.xml><?xml version="1.0" encoding="utf-8"?>
+<p:sld xmlns:a="http://schemas.openxmlformats.org/drawingml/2006/main" xmlns:r="http://schemas.openxmlformats.org/officeDocument/2006/relationships" xmlns:p="http://schemas.openxmlformats.org/presentationml/2006/main">
+  <p:cSld>
+    <p:spTree>
+      <p:nvGrpSpPr>
+        <p:cNvPr id="1" name=""/>
+        <p:cNvGrpSpPr/>
+        <p:nvPr/>
+      </p:nvGrpSpPr>
+      <p:grpSpPr>
+        <a:xfrm>
+          <a:off x="0" y="0"/>
+          <a:ext cx="0" cy="0"/>
+          <a:chOff x="0" y="0"/>
+          <a:chExt cx="0" cy="0"/>
+        </a:xfrm>
+      </p:grpSpPr>
+      <p:sp>
+        <p:nvSpPr>
+          <p:cNvPr id="3" name="Single source">
+            <a:extLst>
+              <a:ext uri="{FF2B5EF4-FFF2-40B4-BE49-F238E27FC236}">
+                <a16:creationId xmlns:a16="http://schemas.microsoft.com/office/drawing/2014/main" id="{1A17F2E3-B345-4AC9-A9F7-D0DF2AB2656A}"/>
+              </a:ext>
+            </a:extLst>
+          </p:cNvPr>
+          <p:cNvSpPr txBox="1"/>
+          <p:nvPr/>
+        </p:nvSpPr>
+        <p:spPr>
+          <a:xfrm>
+            <a:off x="1066800" y="990600"/>
+            <a:ext cx="1828800" cy="369332"/>
+          </a:xfrm>
+          <a:prstGeom prst="rect">
+            <a:avLst/>
+          </a:prstGeom>
+          <a:noFill/>
+        </p:spPr>
+        <p:txBody>
+          <a:bodyPr wrap="square" rtlCol="0">
+            <a:spAutoFit/>
+          </a:bodyPr>
+          <a:lstStyle/>
+          <a:p>
+            <a:r>
+              <a:rPr lang="en-US" dirty="0"/>
+              <a:t>Single</a:t>
+            </a:r>
+          </a:p>
+        </p:txBody>
+      </p:sp>
+      <p:sp>
+        <p:nvSpPr>
+          <p:cNvPr id="17" name="1_5 source">
+            <a:extLst>
+              <a:ext uri="{FF2B5EF4-FFF2-40B4-BE49-F238E27FC236}">
+                <a16:creationId xmlns:a16="http://schemas.microsoft.com/office/drawing/2014/main" id="{3F651EE8-F96D-42F5-A410-0406BB65081D}"/>
+              </a:ext>
+            </a:extLst>
+          </p:cNvPr>
+          <p:cNvSpPr txBox="1"/>
+          <p:nvPr/>
+        </p:nvSpPr>
+        <p:spPr>
+          <a:xfrm>
+            <a:off x="1066800" y="2133600"/>
+            <a:ext cx="1828800" cy="464871"/>
+          </a:xfrm>
+          <a:prstGeom prst="rect">
+            <a:avLst/>
+          </a:prstGeom>
+          <a:noFill/>
+        </p:spPr>
+        <p:txBody>
+          <a:bodyPr wrap="square" rtlCol="0">
+            <a:spAutoFit/>
+          </a:bodyPr>
+          <a:lstStyle/>
+          <a:p>
+            <a:pPr>
+              <a:lnSpc>
+                <a:spcPct val="150000"/>
+              </a:lnSpc>
+            </a:pPr>
+            <a:r>
+              <a:rPr lang="en-US" dirty="0"/>
+              <a:t>1_5</a:t>
+            </a:r>
+          </a:p>
+        </p:txBody>
+      </p:sp>
+      <p:sp>
+        <p:nvSpPr>
+          <p:cNvPr id="18" name="Double source">
+            <a:extLst>
+              <a:ext uri="{FF2B5EF4-FFF2-40B4-BE49-F238E27FC236}">
+                <a16:creationId xmlns:a16="http://schemas.microsoft.com/office/drawing/2014/main" id="{41DF0CCF-B910-4EB8-9301-CF3765C8A1C8}"/>
+              </a:ext>
+            </a:extLst>
+          </p:cNvPr>
+          <p:cNvSpPr txBox="1"/>
+          <p:nvPr/>
+        </p:nvSpPr>
+        <p:spPr>
+          <a:xfrm>
+            <a:off x="1065810" y="3231676"/>
+            <a:ext cx="1828800" cy="568745"/>
+          </a:xfrm>
+          <a:prstGeom prst="rect">
+            <a:avLst/>
+          </a:prstGeom>
+          <a:noFill/>
+        </p:spPr>
+        <p:txBody>
+          <a:bodyPr wrap="square" rtlCol="0">
+            <a:spAutoFit/>
+          </a:bodyPr>
+          <a:lstStyle/>
+          <a:p>
+            <a:pPr>
+              <a:lnSpc>
+                <a:spcPct val="200000"/>
+              </a:lnSpc>
+            </a:pPr>
+            <a:r>
+              <a:rPr lang="en-US" dirty="0"/>
+              <a:t>Double</a:t>
+            </a:r>
+          </a:p>
+        </p:txBody>
+      </p:sp>
+      <p:sp>
+        <p:nvSpPr>
+          <p:cNvPr id="19" name="Exactly40 source">
+            <a:extLst>
+              <a:ext uri="{FF2B5EF4-FFF2-40B4-BE49-F238E27FC236}">
+                <a16:creationId xmlns:a16="http://schemas.microsoft.com/office/drawing/2014/main" id="{0462CC77-9BE3-42E2-B621-0A4C48583177}"/>
+              </a:ext>
+            </a:extLst>
+          </p:cNvPr>
+          <p:cNvSpPr txBox="1"/>
+          <p:nvPr/>
+        </p:nvSpPr>
+        <p:spPr>
+          <a:xfrm>
+            <a:off x="1050966" y="4329752"/>
+            <a:ext cx="1828800" cy="537968"/>
+          </a:xfrm>
+          <a:prstGeom prst="rect">
+            <a:avLst/>
+          </a:prstGeom>
+          <a:noFill/>
+        </p:spPr>
+        <p:txBody>
+          <a:bodyPr wrap="square" rtlCol="0">
+            <a:spAutoFit/>
+          </a:bodyPr>
+          <a:lstStyle/>
+          <a:p>
+            <a:pPr>
+              <a:lnSpc>
+                <a:spcPts val="4000"/>
+              </a:lnSpc>
+            </a:pPr>
+            <a:r>
+              <a:rPr lang="en-US" dirty="0"/>
+              <a:t>Exactly40</a:t>
+            </a:r>
+          </a:p>
+        </p:txBody>
+      </p:sp>
+      <p:sp>
+        <p:nvSpPr>
+          <p:cNvPr id="20" name="Multiple3 source">
+            <a:extLst>
+              <a:ext uri="{FF2B5EF4-FFF2-40B4-BE49-F238E27FC236}">
+                <a16:creationId xmlns:a16="http://schemas.microsoft.com/office/drawing/2014/main" id="{3D53A5A2-EE58-4236-9854-3B7CFC33D132}"/>
+              </a:ext>
+            </a:extLst>
+          </p:cNvPr>
+          <p:cNvSpPr txBox="1"/>
+          <p:nvPr/>
+        </p:nvSpPr>
+        <p:spPr>
+          <a:xfrm>
+            <a:off x="1050966" y="5427828"/>
+            <a:ext cx="1828800" cy="776495"/>
+          </a:xfrm>
+          <a:prstGeom prst="rect">
+            <a:avLst/>
+          </a:prstGeom>
+          <a:noFill/>
+        </p:spPr>
+        <p:txBody>
+          <a:bodyPr wrap="square" rtlCol="0">
+            <a:spAutoFit/>
+          </a:bodyPr>
+          <a:lstStyle/>
+          <a:p>
+            <a:pPr>
+              <a:lnSpc>
+                <a:spcPct val="300000"/>
+              </a:lnSpc>
+            </a:pPr>
+            <a:r>
+              <a:rPr lang="en-US" dirty="0"/>
+              <a:t>Multiple3</a:t>
+            </a:r>
+          </a:p>
+        </p:txBody>
+      </p:sp>
+      <p:sp>
+        <p:nvSpPr>
+          <p:cNvPr id="21" name="Single target">
+            <a:extLst>
+              <a:ext uri="{FF2B5EF4-FFF2-40B4-BE49-F238E27FC236}">
+                <a16:creationId xmlns:a16="http://schemas.microsoft.com/office/drawing/2014/main" id="{7F6E2254-84B0-45F3-8A6F-B531910F51D9}"/>
+              </a:ext>
+            </a:extLst>
+          </p:cNvPr>
+          <p:cNvSpPr txBox="1"/>
+          <p:nvPr/>
+        </p:nvSpPr>
+        <p:spPr>
+          <a:xfrm>
+            <a:off x="6096000" y="990600"/>
+            <a:ext cx="1828800" cy="568745"/>
+          </a:xfrm>
+          <a:prstGeom prst="rect">
+            <a:avLst/>
+          </a:prstGeom>
+          <a:noFill/>
+        </p:spPr>
+        <p:txBody>
+          <a:bodyPr wrap="square" rtlCol="0">
+            <a:spAutoFit/>
+          </a:bodyPr>
+          <a:lstStyle/>
+          <a:p>
+            <a:pPr>
+              <a:lnSpc>
+                <a:spcPct val="200000"/>
+              </a:lnSpc>
+            </a:pPr>
+            <a:r>
+              <a:rPr lang="en-US" b="1" dirty="0"/>
+              <a:t>Single</a:t>
+            </a:r>
+          </a:p>
+        </p:txBody>
+      </p:sp>
+      <p:sp>
+        <p:nvSpPr>
+          <p:cNvPr id="22" name="1_5 target">
+            <a:extLst>
+              <a:ext uri="{FF2B5EF4-FFF2-40B4-BE49-F238E27FC236}">
+                <a16:creationId xmlns:a16="http://schemas.microsoft.com/office/drawing/2014/main" id="{B9EDBEA3-38B7-4A77-AB16-B3A8C5DAD06E}"/>
+              </a:ext>
+            </a:extLst>
+          </p:cNvPr>
+          <p:cNvSpPr txBox="1"/>
+          <p:nvPr/>
+        </p:nvSpPr>
+        <p:spPr>
+          <a:xfrm>
+            <a:off x="6096000" y="2133600"/>
+            <a:ext cx="1828800" cy="537968"/>
+          </a:xfrm>
+          <a:prstGeom prst="rect">
+            <a:avLst/>
+          </a:prstGeom>
+          <a:noFill/>
+        </p:spPr>
+        <p:txBody>
+          <a:bodyPr wrap="square" rtlCol="0">
+            <a:spAutoFit/>
+          </a:bodyPr>
+          <a:lstStyle/>
+          <a:p>
+            <a:pPr>
+              <a:lnSpc>
+                <a:spcPts val="4000"/>
+              </a:lnSpc>
+            </a:pPr>
+            <a:r>
+              <a:rPr lang="en-US" b="1" dirty="0"/>
+              <a:t>1_5</a:t>
+            </a:r>
+          </a:p>
+        </p:txBody>
+      </p:sp>
+      <p:sp>
+        <p:nvSpPr>
+          <p:cNvPr id="23" name="Double target">
+            <a:extLst>
+              <a:ext uri="{FF2B5EF4-FFF2-40B4-BE49-F238E27FC236}">
+                <a16:creationId xmlns:a16="http://schemas.microsoft.com/office/drawing/2014/main" id="{C183B0A2-AE2F-4FFC-9D5F-7C0AC33518ED}"/>
+              </a:ext>
+            </a:extLst>
+          </p:cNvPr>
+          <p:cNvSpPr txBox="1"/>
+          <p:nvPr/>
+        </p:nvSpPr>
+        <p:spPr>
+          <a:xfrm>
+            <a:off x="6095010" y="3231676"/>
+            <a:ext cx="1828800" cy="776495"/>
+          </a:xfrm>
+          <a:prstGeom prst="rect">
+            <a:avLst/>
+          </a:prstGeom>
+          <a:noFill/>
+        </p:spPr>
+        <p:txBody>
+          <a:bodyPr wrap="square" rtlCol="0">
+            <a:spAutoFit/>
+          </a:bodyPr>
+          <a:lstStyle/>
+          <a:p>
+            <a:pPr>
+              <a:lnSpc>
+                <a:spcPct val="300000"/>
+              </a:lnSpc>
+            </a:pPr>
+            <a:r>
+              <a:rPr lang="en-US" b="1" dirty="0"/>
+              <a:t>Double</a:t>
+            </a:r>
+          </a:p>
+        </p:txBody>
+      </p:sp>
+      <p:sp>
+        <p:nvSpPr>
+          <p:cNvPr id="24" name="Exactly40 target">
+            <a:extLst>
+              <a:ext uri="{FF2B5EF4-FFF2-40B4-BE49-F238E27FC236}">
+                <a16:creationId xmlns:a16="http://schemas.microsoft.com/office/drawing/2014/main" id="{CDADD03A-DE6A-4539-BC6F-041068F26FDA}"/>
+              </a:ext>
+            </a:extLst>
+          </p:cNvPr>
+          <p:cNvSpPr txBox="1"/>
+          <p:nvPr/>
+        </p:nvSpPr>
+        <p:spPr>
+          <a:xfrm>
+            <a:off x="6080166" y="4329752"/>
+            <a:ext cx="1828800" cy="369332"/>
+          </a:xfrm>
+          <a:prstGeom prst="rect">
+            <a:avLst/>
+          </a:prstGeom>
+          <a:noFill/>
+        </p:spPr>
+        <p:txBody>
+          <a:bodyPr wrap="square" rtlCol="0">
+            <a:spAutoFit/>
+          </a:bodyPr>
+          <a:lstStyle/>
+          <a:p>
+            <a:r>
+              <a:rPr lang="en-US" b="1" dirty="0"/>
+              <a:t>Exactly40</a:t>
+            </a:r>
+          </a:p>
+        </p:txBody>
+      </p:sp>
+      <p:sp>
+        <p:nvSpPr>
+          <p:cNvPr id="25" name="Multiple3 target">
+            <a:extLst>
+              <a:ext uri="{FF2B5EF4-FFF2-40B4-BE49-F238E27FC236}">
+                <a16:creationId xmlns:a16="http://schemas.microsoft.com/office/drawing/2014/main" id="{BD8D8865-2349-4FED-9381-96CB2C24929B}"/>
+              </a:ext>
+            </a:extLst>
+          </p:cNvPr>
+          <p:cNvSpPr txBox="1"/>
+          <p:nvPr/>
+        </p:nvSpPr>
+        <p:spPr>
+          <a:xfrm>
+            <a:off x="6080166" y="5427828"/>
+            <a:ext cx="1828800" cy="464871"/>
+          </a:xfrm>
+          <a:prstGeom prst="rect">
+            <a:avLst/>
+          </a:prstGeom>
+          <a:noFill/>
+        </p:spPr>
+        <p:txBody>
+          <a:bodyPr wrap="square" rtlCol="0">
+            <a:spAutoFit/>
+          </a:bodyPr>
+          <a:lstStyle/>
+          <a:p>
+            <a:pPr>
+              <a:lnSpc>
+                <a:spcPct val="150000"/>
+              </a:lnSpc>
+            </a:pPr>
+            <a:r>
+              <a:rPr lang="en-US" b="1" dirty="0"/>
+              <a:t>Multiple3</a:t>
+            </a:r>
+          </a:p>
+        </p:txBody>
+      </p:sp>
+    </p:spTree>
+    <p:extLst>
+      <p:ext uri="{BB962C8B-B14F-4D97-AF65-F5344CB8AC3E}">
+        <p14:creationId xmlns:p14="http://schemas.microsoft.com/office/powerpoint/2010/main" val="3419329192"/>
+      </p:ext>
+    </p:extLst>
+  </p:cSld>
+  <p:clrMapOvr>
+    <a:masterClrMapping/>
+  </p:clrMapOvr>
+</p:sld>
+</file>
+
+<file path=ppt/slides/slide13.xml><?xml version="1.0" encoding="utf-8"?>
+<p:sld xmlns:a="http://schemas.openxmlformats.org/drawingml/2006/main" xmlns:r="http://schemas.openxmlformats.org/officeDocument/2006/relationships" xmlns:p="http://schemas.openxmlformats.org/presentationml/2006/main">
+  <p:cSld>
+    <p:spTree>
+      <p:nvGrpSpPr>
+        <p:cNvPr id="1" name=""/>
+        <p:cNvGrpSpPr/>
+        <p:nvPr/>
+      </p:nvGrpSpPr>
+      <p:grpSpPr>
+        <a:xfrm>
+          <a:off x="0" y="0"/>
+          <a:ext cx="0" cy="0"/>
+          <a:chOff x="0" y="0"/>
+          <a:chExt cx="0" cy="0"/>
+        </a:xfrm>
+      </p:grpSpPr>
+      <p:sp>
+        <p:nvSpPr>
+          <p:cNvPr id="3" name="Single source">
+            <a:extLst>
+              <a:ext uri="{FF2B5EF4-FFF2-40B4-BE49-F238E27FC236}">
+                <a16:creationId xmlns:a16="http://schemas.microsoft.com/office/drawing/2014/main" id="{1A17F2E3-B345-4AC9-A9F7-D0DF2AB2656A}"/>
+              </a:ext>
+            </a:extLst>
+          </p:cNvPr>
+          <p:cNvSpPr txBox="1"/>
+          <p:nvPr/>
+        </p:nvSpPr>
+        <p:spPr>
+          <a:xfrm>
+            <a:off x="1066800" y="990600"/>
+            <a:ext cx="1828800" cy="369332"/>
+          </a:xfrm>
+          <a:prstGeom prst="rect">
+            <a:avLst/>
+          </a:prstGeom>
+          <a:noFill/>
+        </p:spPr>
+        <p:txBody>
+          <a:bodyPr wrap="square" rtlCol="0">
+            <a:spAutoFit/>
+          </a:bodyPr>
+          <a:lstStyle/>
+          <a:p>
+            <a:r>
+              <a:rPr lang="en-US" dirty="0"/>
+              <a:t>Single</a:t>
+            </a:r>
+          </a:p>
+        </p:txBody>
+      </p:sp>
+      <p:sp>
+        <p:nvSpPr>
+          <p:cNvPr id="17" name="1_5 source">
+            <a:extLst>
+              <a:ext uri="{FF2B5EF4-FFF2-40B4-BE49-F238E27FC236}">
+                <a16:creationId xmlns:a16="http://schemas.microsoft.com/office/drawing/2014/main" id="{3F651EE8-F96D-42F5-A410-0406BB65081D}"/>
+              </a:ext>
+            </a:extLst>
+          </p:cNvPr>
+          <p:cNvSpPr txBox="1"/>
+          <p:nvPr/>
+        </p:nvSpPr>
+        <p:spPr>
+          <a:xfrm>
+            <a:off x="1066800" y="2133600"/>
+            <a:ext cx="1828800" cy="464871"/>
+          </a:xfrm>
+          <a:prstGeom prst="rect">
+            <a:avLst/>
+          </a:prstGeom>
+          <a:noFill/>
+        </p:spPr>
+        <p:txBody>
+          <a:bodyPr wrap="square" rtlCol="0">
+            <a:spAutoFit/>
+          </a:bodyPr>
+          <a:lstStyle/>
+          <a:p>
+            <a:pPr>
+              <a:lnSpc>
+                <a:spcPct val="150000"/>
+              </a:lnSpc>
+            </a:pPr>
+            <a:r>
+              <a:rPr lang="en-US" dirty="0"/>
+              <a:t>1_5</a:t>
+            </a:r>
+          </a:p>
+        </p:txBody>
+      </p:sp>
+      <p:sp>
+        <p:nvSpPr>
+          <p:cNvPr id="18" name="Double source">
+            <a:extLst>
+              <a:ext uri="{FF2B5EF4-FFF2-40B4-BE49-F238E27FC236}">
+                <a16:creationId xmlns:a16="http://schemas.microsoft.com/office/drawing/2014/main" id="{41DF0CCF-B910-4EB8-9301-CF3765C8A1C8}"/>
+              </a:ext>
+            </a:extLst>
+          </p:cNvPr>
+          <p:cNvSpPr txBox="1"/>
+          <p:nvPr/>
+        </p:nvSpPr>
+        <p:spPr>
+          <a:xfrm>
+            <a:off x="1065810" y="3231676"/>
+            <a:ext cx="1828800" cy="568745"/>
+          </a:xfrm>
+          <a:prstGeom prst="rect">
+            <a:avLst/>
+          </a:prstGeom>
+          <a:noFill/>
+        </p:spPr>
+        <p:txBody>
+          <a:bodyPr wrap="square" rtlCol="0">
+            <a:spAutoFit/>
+          </a:bodyPr>
+          <a:lstStyle/>
+          <a:p>
+            <a:pPr>
+              <a:lnSpc>
+                <a:spcPct val="200000"/>
+              </a:lnSpc>
+            </a:pPr>
+            <a:r>
+              <a:rPr lang="en-US" dirty="0"/>
+              <a:t>Double</a:t>
+            </a:r>
+          </a:p>
+        </p:txBody>
+      </p:sp>
+      <p:sp>
+        <p:nvSpPr>
+          <p:cNvPr id="19" name="Exactly40 source">
+            <a:extLst>
+              <a:ext uri="{FF2B5EF4-FFF2-40B4-BE49-F238E27FC236}">
+                <a16:creationId xmlns:a16="http://schemas.microsoft.com/office/drawing/2014/main" id="{0462CC77-9BE3-42E2-B621-0A4C48583177}"/>
+              </a:ext>
+            </a:extLst>
+          </p:cNvPr>
+          <p:cNvSpPr txBox="1"/>
+          <p:nvPr/>
+        </p:nvSpPr>
+        <p:spPr>
+          <a:xfrm>
+            <a:off x="1050966" y="4329752"/>
+            <a:ext cx="1828800" cy="537968"/>
+          </a:xfrm>
+          <a:prstGeom prst="rect">
+            <a:avLst/>
+          </a:prstGeom>
+          <a:noFill/>
+        </p:spPr>
+        <p:txBody>
+          <a:bodyPr wrap="square" rtlCol="0">
+            <a:spAutoFit/>
+          </a:bodyPr>
+          <a:lstStyle/>
+          <a:p>
+            <a:pPr>
+              <a:lnSpc>
+                <a:spcPts val="4000"/>
+              </a:lnSpc>
+            </a:pPr>
+            <a:r>
+              <a:rPr lang="en-US" dirty="0"/>
+              <a:t>Exactly40</a:t>
+            </a:r>
+          </a:p>
+        </p:txBody>
+      </p:sp>
+      <p:sp>
+        <p:nvSpPr>
+          <p:cNvPr id="20" name="Multiple3 source">
+            <a:extLst>
+              <a:ext uri="{FF2B5EF4-FFF2-40B4-BE49-F238E27FC236}">
+                <a16:creationId xmlns:a16="http://schemas.microsoft.com/office/drawing/2014/main" id="{3D53A5A2-EE58-4236-9854-3B7CFC33D132}"/>
+              </a:ext>
+            </a:extLst>
+          </p:cNvPr>
+          <p:cNvSpPr txBox="1"/>
+          <p:nvPr/>
+        </p:nvSpPr>
+        <p:spPr>
+          <a:xfrm>
+            <a:off x="1050966" y="5427828"/>
+            <a:ext cx="1828800" cy="776495"/>
+          </a:xfrm>
+          <a:prstGeom prst="rect">
+            <a:avLst/>
+          </a:prstGeom>
+          <a:noFill/>
+        </p:spPr>
+        <p:txBody>
+          <a:bodyPr wrap="square" rtlCol="0">
+            <a:spAutoFit/>
+          </a:bodyPr>
+          <a:lstStyle/>
+          <a:p>
+            <a:pPr>
+              <a:lnSpc>
+                <a:spcPct val="300000"/>
+              </a:lnSpc>
+            </a:pPr>
+            <a:r>
+              <a:rPr lang="en-US" dirty="0"/>
+              <a:t>Multiple3</a:t>
+            </a:r>
+          </a:p>
+        </p:txBody>
+      </p:sp>
+      <p:sp>
+        <p:nvSpPr>
+          <p:cNvPr id="21" name="Single target">
+            <a:extLst>
+              <a:ext uri="{FF2B5EF4-FFF2-40B4-BE49-F238E27FC236}">
+                <a16:creationId xmlns:a16="http://schemas.microsoft.com/office/drawing/2014/main" id="{7F6E2254-84B0-45F3-8A6F-B531910F51D9}"/>
+              </a:ext>
+            </a:extLst>
+          </p:cNvPr>
+          <p:cNvSpPr txBox="1"/>
+          <p:nvPr/>
+        </p:nvSpPr>
+        <p:spPr>
+          <a:xfrm>
+            <a:off x="6096000" y="990600"/>
+            <a:ext cx="1828800" cy="369332"/>
+          </a:xfrm>
+          <a:prstGeom prst="rect">
+            <a:avLst/>
+          </a:prstGeom>
+          <a:noFill/>
+        </p:spPr>
+        <p:txBody>
+          <a:bodyPr wrap="square" rtlCol="0">
+            <a:spAutoFit/>
+          </a:bodyPr>
+          <a:lstStyle/>
+          <a:p>
+            <a:r>
+              <a:rPr lang="en-US" b="1" dirty="0"/>
+              <a:t>Single</a:t>
+            </a:r>
+          </a:p>
+        </p:txBody>
+      </p:sp>
+      <p:sp>
+        <p:nvSpPr>
+          <p:cNvPr id="22" name="1_5 target">
+            <a:extLst>
+              <a:ext uri="{FF2B5EF4-FFF2-40B4-BE49-F238E27FC236}">
+                <a16:creationId xmlns:a16="http://schemas.microsoft.com/office/drawing/2014/main" id="{B9EDBEA3-38B7-4A77-AB16-B3A8C5DAD06E}"/>
+              </a:ext>
+            </a:extLst>
+          </p:cNvPr>
+          <p:cNvSpPr txBox="1"/>
+          <p:nvPr/>
+        </p:nvSpPr>
+        <p:spPr>
+          <a:xfrm>
+            <a:off x="6096000" y="2133600"/>
+            <a:ext cx="1828800" cy="464871"/>
+          </a:xfrm>
+          <a:prstGeom prst="rect">
+            <a:avLst/>
+          </a:prstGeom>
+          <a:noFill/>
+        </p:spPr>
+        <p:txBody>
+          <a:bodyPr wrap="square" rtlCol="0">
+            <a:spAutoFit/>
+          </a:bodyPr>
+          <a:lstStyle/>
+          <a:p>
+            <a:pPr>
+              <a:lnSpc>
+                <a:spcPct val="150000"/>
+              </a:lnSpc>
+            </a:pPr>
+            <a:r>
+              <a:rPr lang="en-US" b="1" dirty="0"/>
+              <a:t>1_5</a:t>
+            </a:r>
+          </a:p>
+        </p:txBody>
+      </p:sp>
+      <p:sp>
+        <p:nvSpPr>
+          <p:cNvPr id="23" name="Double target">
+            <a:extLst>
+              <a:ext uri="{FF2B5EF4-FFF2-40B4-BE49-F238E27FC236}">
+                <a16:creationId xmlns:a16="http://schemas.microsoft.com/office/drawing/2014/main" id="{C183B0A2-AE2F-4FFC-9D5F-7C0AC33518ED}"/>
+              </a:ext>
+            </a:extLst>
+          </p:cNvPr>
+          <p:cNvSpPr txBox="1"/>
+          <p:nvPr/>
+        </p:nvSpPr>
+        <p:spPr>
+          <a:xfrm>
+            <a:off x="6095010" y="3231676"/>
+            <a:ext cx="1828800" cy="568745"/>
+          </a:xfrm>
+          <a:prstGeom prst="rect">
+            <a:avLst/>
+          </a:prstGeom>
+          <a:noFill/>
+        </p:spPr>
+        <p:txBody>
+          <a:bodyPr wrap="square" rtlCol="0">
+            <a:spAutoFit/>
+          </a:bodyPr>
+          <a:lstStyle/>
+          <a:p>
+            <a:pPr>
+              <a:lnSpc>
+                <a:spcPct val="200000"/>
+              </a:lnSpc>
+            </a:pPr>
+            <a:r>
+              <a:rPr lang="en-US" b="1" dirty="0"/>
+              <a:t>Double</a:t>
+            </a:r>
+          </a:p>
+        </p:txBody>
+      </p:sp>
+      <p:sp>
+        <p:nvSpPr>
+          <p:cNvPr id="24" name="Exactly40 target">
+            <a:extLst>
+              <a:ext uri="{FF2B5EF4-FFF2-40B4-BE49-F238E27FC236}">
+                <a16:creationId xmlns:a16="http://schemas.microsoft.com/office/drawing/2014/main" id="{CDADD03A-DE6A-4539-BC6F-041068F26FDA}"/>
+              </a:ext>
+            </a:extLst>
+          </p:cNvPr>
+          <p:cNvSpPr txBox="1"/>
+          <p:nvPr/>
+        </p:nvSpPr>
+        <p:spPr>
+          <a:xfrm>
+            <a:off x="6080166" y="4329752"/>
+            <a:ext cx="1828800" cy="537968"/>
+          </a:xfrm>
+          <a:prstGeom prst="rect">
+            <a:avLst/>
+          </a:prstGeom>
+          <a:noFill/>
+        </p:spPr>
+        <p:txBody>
+          <a:bodyPr wrap="square" rtlCol="0">
+            <a:spAutoFit/>
+          </a:bodyPr>
+          <a:lstStyle/>
+          <a:p>
+            <a:pPr>
+              <a:lnSpc>
+                <a:spcPts val="4000"/>
+              </a:lnSpc>
+            </a:pPr>
+            <a:r>
+              <a:rPr lang="en-US" b="1" dirty="0"/>
+              <a:t>Exactly40</a:t>
+            </a:r>
+          </a:p>
+        </p:txBody>
+      </p:sp>
+      <p:sp>
+        <p:nvSpPr>
+          <p:cNvPr id="25" name="Multiple3 target">
+            <a:extLst>
+              <a:ext uri="{FF2B5EF4-FFF2-40B4-BE49-F238E27FC236}">
+                <a16:creationId xmlns:a16="http://schemas.microsoft.com/office/drawing/2014/main" id="{BD8D8865-2349-4FED-9381-96CB2C24929B}"/>
+              </a:ext>
+            </a:extLst>
+          </p:cNvPr>
+          <p:cNvSpPr txBox="1"/>
+          <p:nvPr/>
+        </p:nvSpPr>
+        <p:spPr>
+          <a:xfrm>
+            <a:off x="6080166" y="5427828"/>
+            <a:ext cx="1828800" cy="776495"/>
+          </a:xfrm>
+          <a:prstGeom prst="rect">
+            <a:avLst/>
+          </a:prstGeom>
+          <a:noFill/>
+        </p:spPr>
+        <p:txBody>
+          <a:bodyPr wrap="square" rtlCol="0">
+            <a:spAutoFit/>
+          </a:bodyPr>
+          <a:lstStyle/>
+          <a:p>
+            <a:pPr>
+              <a:lnSpc>
+                <a:spcPct val="300000"/>
+              </a:lnSpc>
+            </a:pPr>
+            <a:r>
+              <a:rPr lang="en-US" b="1" dirty="0"/>
+              <a:t>Multiple3</a:t>
+            </a:r>
+          </a:p>
+        </p:txBody>
+      </p:sp>
+    </p:spTree>
+    <p:extLst>
+      <p:ext uri="{BB962C8B-B14F-4D97-AF65-F5344CB8AC3E}">
+        <p14:creationId xmlns:p14="http://schemas.microsoft.com/office/powerpoint/2010/main" val="802655545"/>
       </p:ext>
     </p:extLst>
   </p:cSld>

</xml_diff>